<commit_message>
Update Process Model Framework.pptx
</commit_message>
<xml_diff>
--- a/Figures PPTs/Process Model Framework.pptx
+++ b/Figures PPTs/Process Model Framework.pptx
@@ -6,6 +6,8 @@
   </p:sldMasterIdLst>
   <p:sldIdLst>
     <p:sldId id="256" r:id="rId2"/>
+    <p:sldId id="258" r:id="rId3"/>
+    <p:sldId id="257" r:id="rId4"/>
   </p:sldIdLst>
   <p:sldSz cx="12192000" cy="6858000"/>
   <p:notesSz cx="6858000" cy="9144000"/>
@@ -104,6 +106,11 @@
       </a:defRPr>
     </a:lvl9pPr>
   </p:defaultTextStyle>
+  <p:extLst>
+    <p:ext uri="{EFAFB233-063F-42B5-8137-9DF3F51BA10A}">
+      <p15:sldGuideLst xmlns:p15="http://schemas.microsoft.com/office/powerpoint/2012/main"/>
+    </p:ext>
+  </p:extLst>
 </p:presentation>
 </file>
 
@@ -254,7 +261,7 @@
           <a:p>
             <a:fld id="{96738633-359C-40D6-B123-B079B7D0AC23}" type="datetimeFigureOut">
               <a:rPr lang="en-US" smtClean="0"/>
-              <a:t>12/7/2022</a:t>
+              <a:t>2/6/2023</a:t>
             </a:fld>
             <a:endParaRPr lang="en-US"/>
           </a:p>
@@ -452,7 +459,7 @@
           <a:p>
             <a:fld id="{96738633-359C-40D6-B123-B079B7D0AC23}" type="datetimeFigureOut">
               <a:rPr lang="en-US" smtClean="0"/>
-              <a:t>12/7/2022</a:t>
+              <a:t>2/6/2023</a:t>
             </a:fld>
             <a:endParaRPr lang="en-US"/>
           </a:p>
@@ -660,7 +667,7 @@
           <a:p>
             <a:fld id="{96738633-359C-40D6-B123-B079B7D0AC23}" type="datetimeFigureOut">
               <a:rPr lang="en-US" smtClean="0"/>
-              <a:t>12/7/2022</a:t>
+              <a:t>2/6/2023</a:t>
             </a:fld>
             <a:endParaRPr lang="en-US"/>
           </a:p>
@@ -858,7 +865,7 @@
           <a:p>
             <a:fld id="{96738633-359C-40D6-B123-B079B7D0AC23}" type="datetimeFigureOut">
               <a:rPr lang="en-US" smtClean="0"/>
-              <a:t>12/7/2022</a:t>
+              <a:t>2/6/2023</a:t>
             </a:fld>
             <a:endParaRPr lang="en-US"/>
           </a:p>
@@ -1133,7 +1140,7 @@
           <a:p>
             <a:fld id="{96738633-359C-40D6-B123-B079B7D0AC23}" type="datetimeFigureOut">
               <a:rPr lang="en-US" smtClean="0"/>
-              <a:t>12/7/2022</a:t>
+              <a:t>2/6/2023</a:t>
             </a:fld>
             <a:endParaRPr lang="en-US"/>
           </a:p>
@@ -1398,7 +1405,7 @@
           <a:p>
             <a:fld id="{96738633-359C-40D6-B123-B079B7D0AC23}" type="datetimeFigureOut">
               <a:rPr lang="en-US" smtClean="0"/>
-              <a:t>12/7/2022</a:t>
+              <a:t>2/6/2023</a:t>
             </a:fld>
             <a:endParaRPr lang="en-US"/>
           </a:p>
@@ -1810,7 +1817,7 @@
           <a:p>
             <a:fld id="{96738633-359C-40D6-B123-B079B7D0AC23}" type="datetimeFigureOut">
               <a:rPr lang="en-US" smtClean="0"/>
-              <a:t>12/7/2022</a:t>
+              <a:t>2/6/2023</a:t>
             </a:fld>
             <a:endParaRPr lang="en-US"/>
           </a:p>
@@ -1951,7 +1958,7 @@
           <a:p>
             <a:fld id="{96738633-359C-40D6-B123-B079B7D0AC23}" type="datetimeFigureOut">
               <a:rPr lang="en-US" smtClean="0"/>
-              <a:t>12/7/2022</a:t>
+              <a:t>2/6/2023</a:t>
             </a:fld>
             <a:endParaRPr lang="en-US"/>
           </a:p>
@@ -2064,7 +2071,7 @@
           <a:p>
             <a:fld id="{96738633-359C-40D6-B123-B079B7D0AC23}" type="datetimeFigureOut">
               <a:rPr lang="en-US" smtClean="0"/>
-              <a:t>12/7/2022</a:t>
+              <a:t>2/6/2023</a:t>
             </a:fld>
             <a:endParaRPr lang="en-US"/>
           </a:p>
@@ -2375,7 +2382,7 @@
           <a:p>
             <a:fld id="{96738633-359C-40D6-B123-B079B7D0AC23}" type="datetimeFigureOut">
               <a:rPr lang="en-US" smtClean="0"/>
-              <a:t>12/7/2022</a:t>
+              <a:t>2/6/2023</a:t>
             </a:fld>
             <a:endParaRPr lang="en-US"/>
           </a:p>
@@ -2663,7 +2670,7 @@
           <a:p>
             <a:fld id="{96738633-359C-40D6-B123-B079B7D0AC23}" type="datetimeFigureOut">
               <a:rPr lang="en-US" smtClean="0"/>
-              <a:t>12/7/2022</a:t>
+              <a:t>2/6/2023</a:t>
             </a:fld>
             <a:endParaRPr lang="en-US"/>
           </a:p>
@@ -2904,7 +2911,7 @@
           <a:p>
             <a:fld id="{96738633-359C-40D6-B123-B079B7D0AC23}" type="datetimeFigureOut">
               <a:rPr lang="en-US" smtClean="0"/>
-              <a:t>12/7/2022</a:t>
+              <a:t>2/6/2023</a:t>
             </a:fld>
             <a:endParaRPr lang="en-US"/>
           </a:p>
@@ -3335,8 +3342,8 @@
         </p:nvSpPr>
         <p:spPr>
           <a:xfrm>
-            <a:off x="203350" y="431040"/>
-            <a:ext cx="8665828" cy="4327229"/>
+            <a:off x="203350" y="427840"/>
+            <a:ext cx="8590272" cy="4186889"/>
           </a:xfrm>
           <a:prstGeom prst="rect">
             <a:avLst/>
@@ -3404,7 +3411,7 @@
           <a:lstStyle/>
           <a:p>
             <a:r>
-              <a:rPr lang="en-US" dirty="0"/>
+              <a:rPr lang="en-US" b="1" dirty="0"/>
               <a:t>45 days harvest season</a:t>
             </a:r>
           </a:p>
@@ -5161,8 +5168,8 @@
         </p:nvSpPr>
         <p:spPr>
           <a:xfrm>
-            <a:off x="3393323" y="4942731"/>
-            <a:ext cx="2285882" cy="369332"/>
+            <a:off x="2860587" y="4851746"/>
+            <a:ext cx="3265894" cy="584775"/>
           </a:xfrm>
           <a:prstGeom prst="rect">
             <a:avLst/>
@@ -5183,8 +5190,14 @@
           <a:lstStyle/>
           <a:p>
             <a:r>
-              <a:rPr lang="en-US" dirty="0"/>
-              <a:t>Measurement of Risk?</a:t>
+              <a:rPr lang="en-US" sz="1600" dirty="0"/>
+              <a:t>Oocyst reaching the system endpoint</a:t>
+            </a:r>
+          </a:p>
+          <a:p>
+            <a:r>
+              <a:rPr lang="en-US" sz="1600" dirty="0"/>
+              <a:t>Relative endpoint oocysts</a:t>
             </a:r>
           </a:p>
         </p:txBody>
@@ -5199,15 +5212,16 @@
             </a:extLst>
           </p:cNvPr>
           <p:cNvCxnSpPr>
+            <a:cxnSpLocks/>
             <a:stCxn id="4" idx="2"/>
             <a:endCxn id="99" idx="0"/>
           </p:cNvCxnSpPr>
           <p:nvPr/>
         </p:nvCxnSpPr>
         <p:spPr>
-          <a:xfrm>
-            <a:off x="4536264" y="4758269"/>
-            <a:ext cx="0" cy="184462"/>
+          <a:xfrm flipH="1">
+            <a:off x="4493534" y="4614729"/>
+            <a:ext cx="4952" cy="237017"/>
           </a:xfrm>
           <a:prstGeom prst="straightConnector1">
             <a:avLst/>
@@ -5235,6 +5249,2971 @@
     <p:extLst>
       <p:ext uri="{BB962C8B-B14F-4D97-AF65-F5344CB8AC3E}">
         <p14:creationId xmlns:p14="http://schemas.microsoft.com/office/powerpoint/2010/main" val="1754147380"/>
+      </p:ext>
+    </p:extLst>
+  </p:cSld>
+  <p:clrMapOvr>
+    <a:masterClrMapping/>
+  </p:clrMapOvr>
+</p:sld>
+</file>
+
+<file path=ppt/slides/slide2.xml><?xml version="1.0" encoding="utf-8"?>
+<p:sld xmlns:a="http://schemas.openxmlformats.org/drawingml/2006/main" xmlns:r="http://schemas.openxmlformats.org/officeDocument/2006/relationships" xmlns:p="http://schemas.openxmlformats.org/presentationml/2006/main">
+  <p:cSld>
+    <p:spTree>
+      <p:nvGrpSpPr>
+        <p:cNvPr id="1" name=""/>
+        <p:cNvGrpSpPr/>
+        <p:nvPr/>
+      </p:nvGrpSpPr>
+      <p:grpSpPr>
+        <a:xfrm>
+          <a:off x="0" y="0"/>
+          <a:ext cx="0" cy="0"/>
+          <a:chOff x="0" y="0"/>
+          <a:chExt cx="0" cy="0"/>
+        </a:xfrm>
+      </p:grpSpPr>
+      <p:sp>
+        <p:nvSpPr>
+          <p:cNvPr id="4" name="Rectangle 3">
+            <a:extLst>
+              <a:ext uri="{FF2B5EF4-FFF2-40B4-BE49-F238E27FC236}">
+                <a16:creationId xmlns:a16="http://schemas.microsoft.com/office/drawing/2014/main" id="{D7EF1B59-8B3E-0219-434C-52A56CDB24B7}"/>
+              </a:ext>
+            </a:extLst>
+          </p:cNvPr>
+          <p:cNvSpPr/>
+          <p:nvPr/>
+        </p:nvSpPr>
+        <p:spPr>
+          <a:xfrm>
+            <a:off x="2455688" y="1062809"/>
+            <a:ext cx="8318857" cy="4236726"/>
+          </a:xfrm>
+          <a:prstGeom prst="rect">
+            <a:avLst/>
+          </a:prstGeom>
+          <a:solidFill>
+            <a:schemeClr val="bg2"/>
+          </a:solidFill>
+          <a:ln>
+            <a:solidFill>
+              <a:schemeClr val="tx1"/>
+            </a:solidFill>
+          </a:ln>
+        </p:spPr>
+        <p:style>
+          <a:lnRef idx="2">
+            <a:schemeClr val="accent1">
+              <a:shade val="50000"/>
+            </a:schemeClr>
+          </a:lnRef>
+          <a:fillRef idx="1">
+            <a:schemeClr val="accent1"/>
+          </a:fillRef>
+          <a:effectRef idx="0">
+            <a:schemeClr val="accent1"/>
+          </a:effectRef>
+          <a:fontRef idx="minor">
+            <a:schemeClr val="lt1"/>
+          </a:fontRef>
+        </p:style>
+        <p:txBody>
+          <a:bodyPr rtlCol="0" anchor="ctr"/>
+          <a:lstStyle/>
+          <a:p>
+            <a:pPr algn="ctr"/>
+            <a:endParaRPr lang="en-US"/>
+          </a:p>
+        </p:txBody>
+      </p:sp>
+      <p:sp>
+        <p:nvSpPr>
+          <p:cNvPr id="5" name="TextBox 4">
+            <a:extLst>
+              <a:ext uri="{FF2B5EF4-FFF2-40B4-BE49-F238E27FC236}">
+                <a16:creationId xmlns:a16="http://schemas.microsoft.com/office/drawing/2014/main" id="{124D8D62-BC80-2C29-E10D-FF3664A26CC1}"/>
+              </a:ext>
+            </a:extLst>
+          </p:cNvPr>
+          <p:cNvSpPr txBox="1"/>
+          <p:nvPr/>
+        </p:nvSpPr>
+        <p:spPr>
+          <a:xfrm>
+            <a:off x="2455688" y="1095501"/>
+            <a:ext cx="2533476" cy="369332"/>
+          </a:xfrm>
+          <a:prstGeom prst="rect">
+            <a:avLst/>
+          </a:prstGeom>
+          <a:noFill/>
+        </p:spPr>
+        <p:txBody>
+          <a:bodyPr wrap="square" rtlCol="0">
+            <a:spAutoFit/>
+          </a:bodyPr>
+          <a:lstStyle/>
+          <a:p>
+            <a:r>
+              <a:rPr lang="en-US" b="1" dirty="0"/>
+              <a:t>45 days harvest season</a:t>
+            </a:r>
+          </a:p>
+        </p:txBody>
+      </p:sp>
+      <p:sp>
+        <p:nvSpPr>
+          <p:cNvPr id="12" name="TextBox 11">
+            <a:extLst>
+              <a:ext uri="{FF2B5EF4-FFF2-40B4-BE49-F238E27FC236}">
+                <a16:creationId xmlns:a16="http://schemas.microsoft.com/office/drawing/2014/main" id="{9842C281-D8BC-B43F-690A-7C6E2DEEB701}"/>
+              </a:ext>
+            </a:extLst>
+          </p:cNvPr>
+          <p:cNvSpPr txBox="1"/>
+          <p:nvPr/>
+        </p:nvSpPr>
+        <p:spPr>
+          <a:xfrm>
+            <a:off x="2568830" y="1749869"/>
+            <a:ext cx="1828345" cy="338554"/>
+          </a:xfrm>
+          <a:prstGeom prst="rect">
+            <a:avLst/>
+          </a:prstGeom>
+          <a:solidFill>
+            <a:schemeClr val="tx1"/>
+          </a:solidFill>
+          <a:ln w="19050">
+            <a:solidFill>
+              <a:srgbClr val="131F33"/>
+            </a:solidFill>
+          </a:ln>
+        </p:spPr>
+        <p:txBody>
+          <a:bodyPr wrap="square" rtlCol="0" anchor="ctr">
+            <a:spAutoFit/>
+          </a:bodyPr>
+          <a:lstStyle/>
+          <a:p>
+            <a:pPr algn="ctr"/>
+            <a:r>
+              <a:rPr lang="en-US" sz="1600" dirty="0">
+                <a:solidFill>
+                  <a:schemeClr val="bg1"/>
+                </a:solidFill>
+              </a:rPr>
+              <a:t>Preharvest (PH)</a:t>
+            </a:r>
+          </a:p>
+        </p:txBody>
+      </p:sp>
+      <p:cxnSp>
+        <p:nvCxnSpPr>
+          <p:cNvPr id="33" name="Straight Arrow Connector 32">
+            <a:extLst>
+              <a:ext uri="{FF2B5EF4-FFF2-40B4-BE49-F238E27FC236}">
+                <a16:creationId xmlns:a16="http://schemas.microsoft.com/office/drawing/2014/main" id="{EAEDEE76-7196-CCD4-8D86-D5B96D23B303}"/>
+              </a:ext>
+            </a:extLst>
+          </p:cNvPr>
+          <p:cNvCxnSpPr>
+            <a:cxnSpLocks/>
+            <a:stCxn id="12" idx="2"/>
+            <a:endCxn id="7" idx="0"/>
+          </p:cNvCxnSpPr>
+          <p:nvPr/>
+        </p:nvCxnSpPr>
+        <p:spPr>
+          <a:xfrm>
+            <a:off x="3483003" y="2088423"/>
+            <a:ext cx="5333" cy="397601"/>
+          </a:xfrm>
+          <a:prstGeom prst="straightConnector1">
+            <a:avLst/>
+          </a:prstGeom>
+          <a:ln w="28575">
+            <a:solidFill>
+              <a:schemeClr val="tx1"/>
+            </a:solidFill>
+            <a:tailEnd type="triangle"/>
+          </a:ln>
+        </p:spPr>
+        <p:style>
+          <a:lnRef idx="1">
+            <a:schemeClr val="accent1"/>
+          </a:lnRef>
+          <a:fillRef idx="0">
+            <a:schemeClr val="accent1"/>
+          </a:fillRef>
+          <a:effectRef idx="0">
+            <a:schemeClr val="accent1"/>
+          </a:effectRef>
+          <a:fontRef idx="minor">
+            <a:schemeClr val="tx1"/>
+          </a:fontRef>
+        </p:style>
+      </p:cxnSp>
+      <p:cxnSp>
+        <p:nvCxnSpPr>
+          <p:cNvPr id="42" name="Connector: Elbow 41">
+            <a:extLst>
+              <a:ext uri="{FF2B5EF4-FFF2-40B4-BE49-F238E27FC236}">
+                <a16:creationId xmlns:a16="http://schemas.microsoft.com/office/drawing/2014/main" id="{9672185F-3F9F-115B-2937-971F1B54E1BB}"/>
+              </a:ext>
+            </a:extLst>
+          </p:cNvPr>
+          <p:cNvCxnSpPr>
+            <a:cxnSpLocks/>
+            <a:stCxn id="12" idx="2"/>
+          </p:cNvCxnSpPr>
+          <p:nvPr/>
+        </p:nvCxnSpPr>
+        <p:spPr>
+          <a:xfrm rot="16200000" flipH="1">
+            <a:off x="4107104" y="1464322"/>
+            <a:ext cx="429370" cy="1677572"/>
+          </a:xfrm>
+          <a:prstGeom prst="bentConnector3">
+            <a:avLst/>
+          </a:prstGeom>
+          <a:ln w="28575">
+            <a:solidFill>
+              <a:schemeClr val="tx1"/>
+            </a:solidFill>
+            <a:tailEnd type="triangle"/>
+          </a:ln>
+        </p:spPr>
+        <p:style>
+          <a:lnRef idx="1">
+            <a:schemeClr val="accent1"/>
+          </a:lnRef>
+          <a:fillRef idx="0">
+            <a:schemeClr val="accent1"/>
+          </a:fillRef>
+          <a:effectRef idx="0">
+            <a:schemeClr val="accent1"/>
+          </a:effectRef>
+          <a:fontRef idx="minor">
+            <a:schemeClr val="tx1"/>
+          </a:fontRef>
+        </p:style>
+      </p:cxnSp>
+      <p:cxnSp>
+        <p:nvCxnSpPr>
+          <p:cNvPr id="51" name="Connector: Elbow 50">
+            <a:extLst>
+              <a:ext uri="{FF2B5EF4-FFF2-40B4-BE49-F238E27FC236}">
+                <a16:creationId xmlns:a16="http://schemas.microsoft.com/office/drawing/2014/main" id="{7FB558AD-FC91-04C0-0B6F-22AAC310F54C}"/>
+              </a:ext>
+            </a:extLst>
+          </p:cNvPr>
+          <p:cNvCxnSpPr>
+            <a:cxnSpLocks/>
+            <a:stCxn id="12" idx="2"/>
+            <a:endCxn id="54" idx="0"/>
+          </p:cNvCxnSpPr>
+          <p:nvPr/>
+        </p:nvCxnSpPr>
+        <p:spPr>
+          <a:xfrm rot="16200000" flipH="1">
+            <a:off x="4955945" y="615480"/>
+            <a:ext cx="409259" cy="3355143"/>
+          </a:xfrm>
+          <a:prstGeom prst="bentConnector3">
+            <a:avLst>
+              <a:gd name="adj1" fmla="val 50000"/>
+            </a:avLst>
+          </a:prstGeom>
+          <a:ln w="28575">
+            <a:solidFill>
+              <a:schemeClr val="tx1"/>
+            </a:solidFill>
+            <a:tailEnd type="triangle"/>
+          </a:ln>
+        </p:spPr>
+        <p:style>
+          <a:lnRef idx="1">
+            <a:schemeClr val="accent1"/>
+          </a:lnRef>
+          <a:fillRef idx="0">
+            <a:schemeClr val="accent1"/>
+          </a:fillRef>
+          <a:effectRef idx="0">
+            <a:schemeClr val="accent1"/>
+          </a:effectRef>
+          <a:fontRef idx="minor">
+            <a:schemeClr val="tx1"/>
+          </a:fontRef>
+        </p:style>
+      </p:cxnSp>
+      <p:sp>
+        <p:nvSpPr>
+          <p:cNvPr id="54" name="Rectangle 53">
+            <a:extLst>
+              <a:ext uri="{FF2B5EF4-FFF2-40B4-BE49-F238E27FC236}">
+                <a16:creationId xmlns:a16="http://schemas.microsoft.com/office/drawing/2014/main" id="{3895D613-7901-005A-7214-6A0E8444759E}"/>
+              </a:ext>
+            </a:extLst>
+          </p:cNvPr>
+          <p:cNvSpPr/>
+          <p:nvPr/>
+        </p:nvSpPr>
+        <p:spPr>
+          <a:xfrm>
+            <a:off x="6074748" y="2497682"/>
+            <a:ext cx="1526796" cy="338554"/>
+          </a:xfrm>
+          <a:prstGeom prst="rect">
+            <a:avLst/>
+          </a:prstGeom>
+          <a:solidFill>
+            <a:schemeClr val="bg1">
+              <a:lumMod val="75000"/>
+            </a:schemeClr>
+          </a:solidFill>
+          <a:ln>
+            <a:solidFill>
+              <a:schemeClr val="tx1">
+                <a:lumMod val="95000"/>
+                <a:lumOff val="5000"/>
+              </a:schemeClr>
+            </a:solidFill>
+          </a:ln>
+        </p:spPr>
+        <p:style>
+          <a:lnRef idx="2">
+            <a:schemeClr val="accent1">
+              <a:shade val="50000"/>
+            </a:schemeClr>
+          </a:lnRef>
+          <a:fillRef idx="1">
+            <a:schemeClr val="accent1"/>
+          </a:fillRef>
+          <a:effectRef idx="0">
+            <a:schemeClr val="accent1"/>
+          </a:effectRef>
+          <a:fontRef idx="minor">
+            <a:schemeClr val="lt1"/>
+          </a:fontRef>
+        </p:style>
+        <p:txBody>
+          <a:bodyPr rtlCol="0" anchor="ctr"/>
+          <a:lstStyle/>
+          <a:p>
+            <a:pPr algn="ctr"/>
+            <a:r>
+              <a:rPr lang="en-US" sz="1200" dirty="0">
+                <a:solidFill>
+                  <a:schemeClr val="tx1"/>
+                </a:solidFill>
+              </a:rPr>
+              <a:t>Product Testing Day?</a:t>
+            </a:r>
+          </a:p>
+        </p:txBody>
+      </p:sp>
+      <p:sp>
+        <p:nvSpPr>
+          <p:cNvPr id="61" name="TextBox 60">
+            <a:extLst>
+              <a:ext uri="{FF2B5EF4-FFF2-40B4-BE49-F238E27FC236}">
+                <a16:creationId xmlns:a16="http://schemas.microsoft.com/office/drawing/2014/main" id="{F281FE88-6115-7F9E-4C30-FD172E8DC6C2}"/>
+              </a:ext>
+            </a:extLst>
+          </p:cNvPr>
+          <p:cNvSpPr txBox="1"/>
+          <p:nvPr/>
+        </p:nvSpPr>
+        <p:spPr>
+          <a:xfrm>
+            <a:off x="6074748" y="4308913"/>
+            <a:ext cx="1526796" cy="261610"/>
+          </a:xfrm>
+          <a:prstGeom prst="rect">
+            <a:avLst/>
+          </a:prstGeom>
+          <a:solidFill>
+            <a:schemeClr val="bg1"/>
+          </a:solidFill>
+          <a:ln w="19050">
+            <a:solidFill>
+              <a:schemeClr val="tx1"/>
+            </a:solidFill>
+          </a:ln>
+        </p:spPr>
+        <p:txBody>
+          <a:bodyPr wrap="square" rtlCol="0" anchor="ctr">
+            <a:spAutoFit/>
+          </a:bodyPr>
+          <a:lstStyle/>
+          <a:p>
+            <a:pPr algn="ctr"/>
+            <a:r>
+              <a:rPr lang="en-US" sz="1050" dirty="0"/>
+              <a:t>Detection Yes/No</a:t>
+            </a:r>
+          </a:p>
+        </p:txBody>
+      </p:sp>
+      <p:sp>
+        <p:nvSpPr>
+          <p:cNvPr id="65" name="TextBox 64">
+            <a:extLst>
+              <a:ext uri="{FF2B5EF4-FFF2-40B4-BE49-F238E27FC236}">
+                <a16:creationId xmlns:a16="http://schemas.microsoft.com/office/drawing/2014/main" id="{10136F02-FB42-42C3-F8D8-1981D11285D1}"/>
+              </a:ext>
+            </a:extLst>
+          </p:cNvPr>
+          <p:cNvSpPr txBox="1"/>
+          <p:nvPr/>
+        </p:nvSpPr>
+        <p:spPr>
+          <a:xfrm>
+            <a:off x="6074748" y="4707659"/>
+            <a:ext cx="1526796" cy="261610"/>
+          </a:xfrm>
+          <a:prstGeom prst="rect">
+            <a:avLst/>
+          </a:prstGeom>
+          <a:solidFill>
+            <a:schemeClr val="bg1"/>
+          </a:solidFill>
+          <a:ln w="19050">
+            <a:solidFill>
+              <a:schemeClr val="tx1"/>
+            </a:solidFill>
+          </a:ln>
+        </p:spPr>
+        <p:txBody>
+          <a:bodyPr wrap="square" rtlCol="0" anchor="ctr">
+            <a:spAutoFit/>
+          </a:bodyPr>
+          <a:lstStyle/>
+          <a:p>
+            <a:pPr algn="ctr"/>
+            <a:r>
+              <a:rPr lang="en-US" sz="1050" dirty="0"/>
+              <a:t>Accept/Reject Product</a:t>
+            </a:r>
+          </a:p>
+        </p:txBody>
+      </p:sp>
+      <p:sp>
+        <p:nvSpPr>
+          <p:cNvPr id="62" name="TextBox 61">
+            <a:extLst>
+              <a:ext uri="{FF2B5EF4-FFF2-40B4-BE49-F238E27FC236}">
+                <a16:creationId xmlns:a16="http://schemas.microsoft.com/office/drawing/2014/main" id="{A242A24F-FDBC-9456-400A-747FB506CF8A}"/>
+              </a:ext>
+            </a:extLst>
+          </p:cNvPr>
+          <p:cNvSpPr txBox="1"/>
+          <p:nvPr/>
+        </p:nvSpPr>
+        <p:spPr>
+          <a:xfrm>
+            <a:off x="6077852" y="2974484"/>
+            <a:ext cx="1526796" cy="415498"/>
+          </a:xfrm>
+          <a:prstGeom prst="rect">
+            <a:avLst/>
+          </a:prstGeom>
+          <a:solidFill>
+            <a:schemeClr val="bg1"/>
+          </a:solidFill>
+          <a:ln w="19050">
+            <a:solidFill>
+              <a:schemeClr val="tx1"/>
+            </a:solidFill>
+          </a:ln>
+        </p:spPr>
+        <p:txBody>
+          <a:bodyPr wrap="square" rtlCol="0" anchor="ctr">
+            <a:spAutoFit/>
+          </a:bodyPr>
+          <a:lstStyle/>
+          <a:p>
+            <a:pPr algn="ctr"/>
+            <a:r>
+              <a:rPr lang="en-US" sz="1050" dirty="0"/>
+              <a:t>25 g Sample (s) collection</a:t>
+            </a:r>
+          </a:p>
+        </p:txBody>
+      </p:sp>
+      <p:sp>
+        <p:nvSpPr>
+          <p:cNvPr id="63" name="TextBox 62">
+            <a:extLst>
+              <a:ext uri="{FF2B5EF4-FFF2-40B4-BE49-F238E27FC236}">
+                <a16:creationId xmlns:a16="http://schemas.microsoft.com/office/drawing/2014/main" id="{7A0442ED-D42D-D5B6-B53E-92AF5EC753A5}"/>
+              </a:ext>
+            </a:extLst>
+          </p:cNvPr>
+          <p:cNvSpPr txBox="1"/>
+          <p:nvPr/>
+        </p:nvSpPr>
+        <p:spPr>
+          <a:xfrm>
+            <a:off x="6077852" y="3520722"/>
+            <a:ext cx="1526796" cy="253916"/>
+          </a:xfrm>
+          <a:prstGeom prst="rect">
+            <a:avLst/>
+          </a:prstGeom>
+          <a:solidFill>
+            <a:schemeClr val="bg1"/>
+          </a:solidFill>
+          <a:ln w="19050">
+            <a:solidFill>
+              <a:schemeClr val="tx1"/>
+            </a:solidFill>
+          </a:ln>
+        </p:spPr>
+        <p:txBody>
+          <a:bodyPr wrap="square" rtlCol="0" anchor="ctr">
+            <a:spAutoFit/>
+          </a:bodyPr>
+          <a:lstStyle/>
+          <a:p>
+            <a:pPr algn="ctr"/>
+            <a:r>
+              <a:rPr lang="en-US" sz="1050" dirty="0"/>
+              <a:t>Sample filtration</a:t>
+            </a:r>
+          </a:p>
+        </p:txBody>
+      </p:sp>
+      <p:sp>
+        <p:nvSpPr>
+          <p:cNvPr id="64" name="TextBox 63">
+            <a:extLst>
+              <a:ext uri="{FF2B5EF4-FFF2-40B4-BE49-F238E27FC236}">
+                <a16:creationId xmlns:a16="http://schemas.microsoft.com/office/drawing/2014/main" id="{EEECD7F9-A842-B8B4-F3AE-1CBC28499681}"/>
+              </a:ext>
+            </a:extLst>
+          </p:cNvPr>
+          <p:cNvSpPr txBox="1"/>
+          <p:nvPr/>
+        </p:nvSpPr>
+        <p:spPr>
+          <a:xfrm>
+            <a:off x="6077852" y="3913932"/>
+            <a:ext cx="1526796" cy="261610"/>
+          </a:xfrm>
+          <a:prstGeom prst="rect">
+            <a:avLst/>
+          </a:prstGeom>
+          <a:solidFill>
+            <a:schemeClr val="bg1"/>
+          </a:solidFill>
+          <a:ln w="19050">
+            <a:solidFill>
+              <a:schemeClr val="tx1"/>
+            </a:solidFill>
+          </a:ln>
+        </p:spPr>
+        <p:txBody>
+          <a:bodyPr wrap="square" rtlCol="0" anchor="ctr">
+            <a:spAutoFit/>
+          </a:bodyPr>
+          <a:lstStyle/>
+          <a:p>
+            <a:pPr algn="ctr"/>
+            <a:r>
+              <a:rPr lang="en-US" sz="1050" dirty="0"/>
+              <a:t>qPCR</a:t>
+            </a:r>
+          </a:p>
+        </p:txBody>
+      </p:sp>
+      <p:sp>
+        <p:nvSpPr>
+          <p:cNvPr id="69" name="Rectangle 68">
+            <a:extLst>
+              <a:ext uri="{FF2B5EF4-FFF2-40B4-BE49-F238E27FC236}">
+                <a16:creationId xmlns:a16="http://schemas.microsoft.com/office/drawing/2014/main" id="{79D17B4D-7820-D736-F64B-BCDA34F0A2B8}"/>
+              </a:ext>
+            </a:extLst>
+          </p:cNvPr>
+          <p:cNvSpPr/>
+          <p:nvPr/>
+        </p:nvSpPr>
+        <p:spPr>
+          <a:xfrm>
+            <a:off x="6462307" y="1752091"/>
+            <a:ext cx="1526796" cy="338554"/>
+          </a:xfrm>
+          <a:prstGeom prst="rect">
+            <a:avLst/>
+          </a:prstGeom>
+          <a:solidFill>
+            <a:schemeClr val="bg1">
+              <a:lumMod val="75000"/>
+            </a:schemeClr>
+          </a:solidFill>
+          <a:ln>
+            <a:solidFill>
+              <a:schemeClr val="tx1">
+                <a:lumMod val="95000"/>
+                <a:lumOff val="5000"/>
+              </a:schemeClr>
+            </a:solidFill>
+          </a:ln>
+        </p:spPr>
+        <p:style>
+          <a:lnRef idx="2">
+            <a:schemeClr val="accent1">
+              <a:shade val="50000"/>
+            </a:schemeClr>
+          </a:lnRef>
+          <a:fillRef idx="1">
+            <a:schemeClr val="accent1"/>
+          </a:fillRef>
+          <a:effectRef idx="0">
+            <a:schemeClr val="accent1"/>
+          </a:effectRef>
+          <a:fontRef idx="minor">
+            <a:schemeClr val="lt1"/>
+          </a:fontRef>
+        </p:style>
+        <p:txBody>
+          <a:bodyPr rtlCol="0" anchor="ctr"/>
+          <a:lstStyle/>
+          <a:p>
+            <a:pPr algn="ctr"/>
+            <a:r>
+              <a:rPr lang="en-US" sz="1200" dirty="0">
+                <a:solidFill>
+                  <a:schemeClr val="tx1"/>
+                </a:solidFill>
+              </a:rPr>
+              <a:t>Final day</a:t>
+            </a:r>
+          </a:p>
+        </p:txBody>
+      </p:sp>
+      <p:cxnSp>
+        <p:nvCxnSpPr>
+          <p:cNvPr id="70" name="Straight Arrow Connector 69">
+            <a:extLst>
+              <a:ext uri="{FF2B5EF4-FFF2-40B4-BE49-F238E27FC236}">
+                <a16:creationId xmlns:a16="http://schemas.microsoft.com/office/drawing/2014/main" id="{4A9715C6-C431-E6A1-836A-0F3AD0FB5B67}"/>
+              </a:ext>
+            </a:extLst>
+          </p:cNvPr>
+          <p:cNvCxnSpPr>
+            <a:cxnSpLocks/>
+            <a:stCxn id="12" idx="3"/>
+            <a:endCxn id="69" idx="1"/>
+          </p:cNvCxnSpPr>
+          <p:nvPr/>
+        </p:nvCxnSpPr>
+        <p:spPr>
+          <a:xfrm>
+            <a:off x="4397175" y="1919146"/>
+            <a:ext cx="2065132" cy="2222"/>
+          </a:xfrm>
+          <a:prstGeom prst="straightConnector1">
+            <a:avLst/>
+          </a:prstGeom>
+          <a:ln w="28575">
+            <a:solidFill>
+              <a:schemeClr val="tx1"/>
+            </a:solidFill>
+            <a:tailEnd type="triangle"/>
+          </a:ln>
+        </p:spPr>
+        <p:style>
+          <a:lnRef idx="1">
+            <a:schemeClr val="accent1"/>
+          </a:lnRef>
+          <a:fillRef idx="0">
+            <a:schemeClr val="accent1"/>
+          </a:fillRef>
+          <a:effectRef idx="0">
+            <a:schemeClr val="accent1"/>
+          </a:effectRef>
+          <a:fontRef idx="minor">
+            <a:schemeClr val="tx1"/>
+          </a:fontRef>
+        </p:style>
+      </p:cxnSp>
+      <p:sp>
+        <p:nvSpPr>
+          <p:cNvPr id="73" name="TextBox 72">
+            <a:extLst>
+              <a:ext uri="{FF2B5EF4-FFF2-40B4-BE49-F238E27FC236}">
+                <a16:creationId xmlns:a16="http://schemas.microsoft.com/office/drawing/2014/main" id="{E81CAEA8-6ED1-88B4-9222-66005FBCD0DF}"/>
+              </a:ext>
+            </a:extLst>
+          </p:cNvPr>
+          <p:cNvSpPr txBox="1"/>
+          <p:nvPr/>
+        </p:nvSpPr>
+        <p:spPr>
+          <a:xfrm>
+            <a:off x="8835492" y="1749869"/>
+            <a:ext cx="1828345" cy="338554"/>
+          </a:xfrm>
+          <a:prstGeom prst="rect">
+            <a:avLst/>
+          </a:prstGeom>
+          <a:solidFill>
+            <a:schemeClr val="tx1"/>
+          </a:solidFill>
+          <a:ln w="19050">
+            <a:solidFill>
+              <a:srgbClr val="131F33"/>
+            </a:solidFill>
+          </a:ln>
+        </p:spPr>
+        <p:txBody>
+          <a:bodyPr wrap="square" rtlCol="0" anchor="ctr">
+            <a:spAutoFit/>
+          </a:bodyPr>
+          <a:lstStyle/>
+          <a:p>
+            <a:pPr algn="ctr"/>
+            <a:r>
+              <a:rPr lang="en-US" sz="1600" dirty="0">
+                <a:solidFill>
+                  <a:schemeClr val="bg1"/>
+                </a:solidFill>
+              </a:rPr>
+              <a:t>Harvest (H)</a:t>
+            </a:r>
+          </a:p>
+        </p:txBody>
+      </p:sp>
+      <p:cxnSp>
+        <p:nvCxnSpPr>
+          <p:cNvPr id="74" name="Straight Arrow Connector 73">
+            <a:extLst>
+              <a:ext uri="{FF2B5EF4-FFF2-40B4-BE49-F238E27FC236}">
+                <a16:creationId xmlns:a16="http://schemas.microsoft.com/office/drawing/2014/main" id="{F4B93312-86DC-E88E-8BD0-B30781444B34}"/>
+              </a:ext>
+            </a:extLst>
+          </p:cNvPr>
+          <p:cNvCxnSpPr>
+            <a:cxnSpLocks/>
+            <a:stCxn id="69" idx="3"/>
+            <a:endCxn id="73" idx="1"/>
+          </p:cNvCxnSpPr>
+          <p:nvPr/>
+        </p:nvCxnSpPr>
+        <p:spPr>
+          <a:xfrm flipV="1">
+            <a:off x="7989103" y="1919146"/>
+            <a:ext cx="846389" cy="2222"/>
+          </a:xfrm>
+          <a:prstGeom prst="straightConnector1">
+            <a:avLst/>
+          </a:prstGeom>
+          <a:ln w="28575">
+            <a:solidFill>
+              <a:schemeClr val="tx1"/>
+            </a:solidFill>
+            <a:tailEnd type="triangle"/>
+          </a:ln>
+        </p:spPr>
+        <p:style>
+          <a:lnRef idx="1">
+            <a:schemeClr val="accent1"/>
+          </a:lnRef>
+          <a:fillRef idx="0">
+            <a:schemeClr val="accent1"/>
+          </a:fillRef>
+          <a:effectRef idx="0">
+            <a:schemeClr val="accent1"/>
+          </a:effectRef>
+          <a:fontRef idx="minor">
+            <a:schemeClr val="tx1"/>
+          </a:fontRef>
+        </p:style>
+      </p:cxnSp>
+      <p:sp>
+        <p:nvSpPr>
+          <p:cNvPr id="78" name="TextBox 77">
+            <a:extLst>
+              <a:ext uri="{FF2B5EF4-FFF2-40B4-BE49-F238E27FC236}">
+                <a16:creationId xmlns:a16="http://schemas.microsoft.com/office/drawing/2014/main" id="{68035471-740E-86F4-B00F-443809FA1675}"/>
+              </a:ext>
+            </a:extLst>
+          </p:cNvPr>
+          <p:cNvSpPr txBox="1"/>
+          <p:nvPr/>
+        </p:nvSpPr>
+        <p:spPr>
+          <a:xfrm>
+            <a:off x="8971660" y="4272056"/>
+            <a:ext cx="1526796" cy="261610"/>
+          </a:xfrm>
+          <a:prstGeom prst="rect">
+            <a:avLst/>
+          </a:prstGeom>
+          <a:solidFill>
+            <a:schemeClr val="bg1"/>
+          </a:solidFill>
+          <a:ln w="19050">
+            <a:solidFill>
+              <a:schemeClr val="tx1"/>
+            </a:solidFill>
+          </a:ln>
+        </p:spPr>
+        <p:txBody>
+          <a:bodyPr wrap="square" rtlCol="0" anchor="ctr">
+            <a:spAutoFit/>
+          </a:bodyPr>
+          <a:lstStyle/>
+          <a:p>
+            <a:pPr algn="ctr"/>
+            <a:r>
+              <a:rPr lang="en-US" sz="1050" dirty="0"/>
+              <a:t>Detection Yes/No</a:t>
+            </a:r>
+          </a:p>
+        </p:txBody>
+      </p:sp>
+      <p:sp>
+        <p:nvSpPr>
+          <p:cNvPr id="79" name="TextBox 78">
+            <a:extLst>
+              <a:ext uri="{FF2B5EF4-FFF2-40B4-BE49-F238E27FC236}">
+                <a16:creationId xmlns:a16="http://schemas.microsoft.com/office/drawing/2014/main" id="{D4952783-D5A8-68B3-621C-E9B396BAEC88}"/>
+              </a:ext>
+            </a:extLst>
+          </p:cNvPr>
+          <p:cNvSpPr txBox="1"/>
+          <p:nvPr/>
+        </p:nvSpPr>
+        <p:spPr>
+          <a:xfrm>
+            <a:off x="8972913" y="4684303"/>
+            <a:ext cx="1526796" cy="261610"/>
+          </a:xfrm>
+          <a:prstGeom prst="rect">
+            <a:avLst/>
+          </a:prstGeom>
+          <a:solidFill>
+            <a:schemeClr val="bg1"/>
+          </a:solidFill>
+          <a:ln w="19050">
+            <a:solidFill>
+              <a:schemeClr val="tx1"/>
+            </a:solidFill>
+          </a:ln>
+        </p:spPr>
+        <p:txBody>
+          <a:bodyPr wrap="square" rtlCol="0" anchor="ctr">
+            <a:spAutoFit/>
+          </a:bodyPr>
+          <a:lstStyle/>
+          <a:p>
+            <a:pPr algn="ctr"/>
+            <a:r>
+              <a:rPr lang="en-US" sz="1050" dirty="0"/>
+              <a:t>Accept/Reject Product</a:t>
+            </a:r>
+          </a:p>
+        </p:txBody>
+      </p:sp>
+      <p:sp>
+        <p:nvSpPr>
+          <p:cNvPr id="80" name="TextBox 79">
+            <a:extLst>
+              <a:ext uri="{FF2B5EF4-FFF2-40B4-BE49-F238E27FC236}">
+                <a16:creationId xmlns:a16="http://schemas.microsoft.com/office/drawing/2014/main" id="{651B1040-2690-BED5-5888-B1DEB586DEDA}"/>
+              </a:ext>
+            </a:extLst>
+          </p:cNvPr>
+          <p:cNvSpPr txBox="1"/>
+          <p:nvPr/>
+        </p:nvSpPr>
+        <p:spPr>
+          <a:xfrm>
+            <a:off x="8983544" y="2980349"/>
+            <a:ext cx="1526796" cy="415498"/>
+          </a:xfrm>
+          <a:prstGeom prst="rect">
+            <a:avLst/>
+          </a:prstGeom>
+          <a:solidFill>
+            <a:schemeClr val="bg1"/>
+          </a:solidFill>
+          <a:ln w="19050">
+            <a:solidFill>
+              <a:schemeClr val="tx1"/>
+            </a:solidFill>
+          </a:ln>
+        </p:spPr>
+        <p:txBody>
+          <a:bodyPr wrap="square" rtlCol="0" anchor="ctr">
+            <a:spAutoFit/>
+          </a:bodyPr>
+          <a:lstStyle/>
+          <a:p>
+            <a:pPr algn="ctr"/>
+            <a:r>
+              <a:rPr lang="en-US" sz="1050" dirty="0"/>
+              <a:t>25 g Sample (s) collection</a:t>
+            </a:r>
+          </a:p>
+        </p:txBody>
+      </p:sp>
+      <p:sp>
+        <p:nvSpPr>
+          <p:cNvPr id="81" name="TextBox 80">
+            <a:extLst>
+              <a:ext uri="{FF2B5EF4-FFF2-40B4-BE49-F238E27FC236}">
+                <a16:creationId xmlns:a16="http://schemas.microsoft.com/office/drawing/2014/main" id="{CB630E62-DF3F-939D-9012-959F2ED2083A}"/>
+              </a:ext>
+            </a:extLst>
+          </p:cNvPr>
+          <p:cNvSpPr txBox="1"/>
+          <p:nvPr/>
+        </p:nvSpPr>
+        <p:spPr>
+          <a:xfrm>
+            <a:off x="8983310" y="3526595"/>
+            <a:ext cx="1526796" cy="253916"/>
+          </a:xfrm>
+          <a:prstGeom prst="rect">
+            <a:avLst/>
+          </a:prstGeom>
+          <a:solidFill>
+            <a:schemeClr val="bg1"/>
+          </a:solidFill>
+          <a:ln w="19050">
+            <a:solidFill>
+              <a:schemeClr val="tx1"/>
+            </a:solidFill>
+          </a:ln>
+        </p:spPr>
+        <p:txBody>
+          <a:bodyPr wrap="square" rtlCol="0" anchor="ctr">
+            <a:spAutoFit/>
+          </a:bodyPr>
+          <a:lstStyle/>
+          <a:p>
+            <a:pPr algn="ctr"/>
+            <a:r>
+              <a:rPr lang="en-US" sz="1050" dirty="0"/>
+              <a:t>Sample filtration</a:t>
+            </a:r>
+          </a:p>
+        </p:txBody>
+      </p:sp>
+      <p:sp>
+        <p:nvSpPr>
+          <p:cNvPr id="82" name="TextBox 81">
+            <a:extLst>
+              <a:ext uri="{FF2B5EF4-FFF2-40B4-BE49-F238E27FC236}">
+                <a16:creationId xmlns:a16="http://schemas.microsoft.com/office/drawing/2014/main" id="{144CA008-B7A7-14EF-95BD-6A885B8F4D92}"/>
+              </a:ext>
+            </a:extLst>
+          </p:cNvPr>
+          <p:cNvSpPr txBox="1"/>
+          <p:nvPr/>
+        </p:nvSpPr>
+        <p:spPr>
+          <a:xfrm>
+            <a:off x="8983310" y="3894167"/>
+            <a:ext cx="1526796" cy="261610"/>
+          </a:xfrm>
+          <a:prstGeom prst="rect">
+            <a:avLst/>
+          </a:prstGeom>
+          <a:solidFill>
+            <a:schemeClr val="bg1"/>
+          </a:solidFill>
+          <a:ln w="19050">
+            <a:solidFill>
+              <a:schemeClr val="tx1"/>
+            </a:solidFill>
+          </a:ln>
+        </p:spPr>
+        <p:txBody>
+          <a:bodyPr wrap="square" rtlCol="0" anchor="ctr">
+            <a:spAutoFit/>
+          </a:bodyPr>
+          <a:lstStyle/>
+          <a:p>
+            <a:pPr algn="ctr"/>
+            <a:r>
+              <a:rPr lang="en-US" sz="1050" dirty="0"/>
+              <a:t>qPCR</a:t>
+            </a:r>
+          </a:p>
+        </p:txBody>
+      </p:sp>
+      <p:cxnSp>
+        <p:nvCxnSpPr>
+          <p:cNvPr id="87" name="Straight Arrow Connector 86">
+            <a:extLst>
+              <a:ext uri="{FF2B5EF4-FFF2-40B4-BE49-F238E27FC236}">
+                <a16:creationId xmlns:a16="http://schemas.microsoft.com/office/drawing/2014/main" id="{3B051FF7-0561-90E9-B6F2-DC3488141E03}"/>
+              </a:ext>
+            </a:extLst>
+          </p:cNvPr>
+          <p:cNvCxnSpPr>
+            <a:cxnSpLocks/>
+            <a:stCxn id="10" idx="2"/>
+            <a:endCxn id="18" idx="0"/>
+          </p:cNvCxnSpPr>
+          <p:nvPr/>
+        </p:nvCxnSpPr>
+        <p:spPr>
+          <a:xfrm>
+            <a:off x="5162637" y="4650787"/>
+            <a:ext cx="3104" cy="164321"/>
+          </a:xfrm>
+          <a:prstGeom prst="straightConnector1">
+            <a:avLst/>
+          </a:prstGeom>
+          <a:ln w="28575">
+            <a:solidFill>
+              <a:schemeClr val="tx1"/>
+            </a:solidFill>
+            <a:tailEnd type="triangle"/>
+          </a:ln>
+        </p:spPr>
+        <p:style>
+          <a:lnRef idx="1">
+            <a:schemeClr val="accent1"/>
+          </a:lnRef>
+          <a:fillRef idx="0">
+            <a:schemeClr val="accent1"/>
+          </a:fillRef>
+          <a:effectRef idx="0">
+            <a:schemeClr val="accent1"/>
+          </a:effectRef>
+          <a:fontRef idx="minor">
+            <a:schemeClr val="tx1"/>
+          </a:fontRef>
+        </p:style>
+      </p:cxnSp>
+      <p:cxnSp>
+        <p:nvCxnSpPr>
+          <p:cNvPr id="90" name="Straight Arrow Connector 89">
+            <a:extLst>
+              <a:ext uri="{FF2B5EF4-FFF2-40B4-BE49-F238E27FC236}">
+                <a16:creationId xmlns:a16="http://schemas.microsoft.com/office/drawing/2014/main" id="{7D1AAB43-85CB-B9B9-F4C4-D26CB16006E9}"/>
+              </a:ext>
+            </a:extLst>
+          </p:cNvPr>
+          <p:cNvCxnSpPr>
+            <a:cxnSpLocks/>
+            <a:stCxn id="61" idx="2"/>
+            <a:endCxn id="65" idx="0"/>
+          </p:cNvCxnSpPr>
+          <p:nvPr/>
+        </p:nvCxnSpPr>
+        <p:spPr>
+          <a:xfrm>
+            <a:off x="6838146" y="4570523"/>
+            <a:ext cx="0" cy="137136"/>
+          </a:xfrm>
+          <a:prstGeom prst="straightConnector1">
+            <a:avLst/>
+          </a:prstGeom>
+          <a:ln w="28575">
+            <a:solidFill>
+              <a:schemeClr val="tx1"/>
+            </a:solidFill>
+            <a:tailEnd type="triangle"/>
+          </a:ln>
+        </p:spPr>
+        <p:style>
+          <a:lnRef idx="1">
+            <a:schemeClr val="accent1"/>
+          </a:lnRef>
+          <a:fillRef idx="0">
+            <a:schemeClr val="accent1"/>
+          </a:fillRef>
+          <a:effectRef idx="0">
+            <a:schemeClr val="accent1"/>
+          </a:effectRef>
+          <a:fontRef idx="minor">
+            <a:schemeClr val="tx1"/>
+          </a:fontRef>
+        </p:style>
+      </p:cxnSp>
+      <p:cxnSp>
+        <p:nvCxnSpPr>
+          <p:cNvPr id="93" name="Straight Arrow Connector 92">
+            <a:extLst>
+              <a:ext uri="{FF2B5EF4-FFF2-40B4-BE49-F238E27FC236}">
+                <a16:creationId xmlns:a16="http://schemas.microsoft.com/office/drawing/2014/main" id="{04800C88-89FC-5A0C-8F6E-1E42A91AD8A6}"/>
+              </a:ext>
+            </a:extLst>
+          </p:cNvPr>
+          <p:cNvCxnSpPr>
+            <a:cxnSpLocks/>
+            <a:stCxn id="78" idx="2"/>
+            <a:endCxn id="79" idx="0"/>
+          </p:cNvCxnSpPr>
+          <p:nvPr/>
+        </p:nvCxnSpPr>
+        <p:spPr>
+          <a:xfrm>
+            <a:off x="9735058" y="4533666"/>
+            <a:ext cx="1253" cy="150637"/>
+          </a:xfrm>
+          <a:prstGeom prst="straightConnector1">
+            <a:avLst/>
+          </a:prstGeom>
+          <a:ln w="28575">
+            <a:solidFill>
+              <a:schemeClr val="tx1"/>
+            </a:solidFill>
+            <a:tailEnd type="triangle"/>
+          </a:ln>
+        </p:spPr>
+        <p:style>
+          <a:lnRef idx="1">
+            <a:schemeClr val="accent1"/>
+          </a:lnRef>
+          <a:fillRef idx="0">
+            <a:schemeClr val="accent1"/>
+          </a:fillRef>
+          <a:effectRef idx="0">
+            <a:schemeClr val="accent1"/>
+          </a:effectRef>
+          <a:fontRef idx="minor">
+            <a:schemeClr val="tx1"/>
+          </a:fontRef>
+        </p:style>
+      </p:cxnSp>
+      <p:cxnSp>
+        <p:nvCxnSpPr>
+          <p:cNvPr id="96" name="Straight Arrow Connector 95">
+            <a:extLst>
+              <a:ext uri="{FF2B5EF4-FFF2-40B4-BE49-F238E27FC236}">
+                <a16:creationId xmlns:a16="http://schemas.microsoft.com/office/drawing/2014/main" id="{93EFC944-73ED-8C27-9048-FA367A2C9962}"/>
+              </a:ext>
+            </a:extLst>
+          </p:cNvPr>
+          <p:cNvCxnSpPr>
+            <a:cxnSpLocks/>
+            <a:stCxn id="73" idx="2"/>
+            <a:endCxn id="45" idx="0"/>
+          </p:cNvCxnSpPr>
+          <p:nvPr/>
+        </p:nvCxnSpPr>
+        <p:spPr>
+          <a:xfrm flipH="1">
+            <a:off x="9746708" y="2088423"/>
+            <a:ext cx="2957" cy="425818"/>
+          </a:xfrm>
+          <a:prstGeom prst="straightConnector1">
+            <a:avLst/>
+          </a:prstGeom>
+          <a:ln w="28575">
+            <a:solidFill>
+              <a:schemeClr val="tx1"/>
+            </a:solidFill>
+            <a:tailEnd type="triangle"/>
+          </a:ln>
+        </p:spPr>
+        <p:style>
+          <a:lnRef idx="1">
+            <a:schemeClr val="accent1"/>
+          </a:lnRef>
+          <a:fillRef idx="0">
+            <a:schemeClr val="accent1"/>
+          </a:fillRef>
+          <a:effectRef idx="0">
+            <a:schemeClr val="accent1"/>
+          </a:effectRef>
+          <a:fontRef idx="minor">
+            <a:schemeClr val="tx1"/>
+          </a:fontRef>
+        </p:style>
+      </p:cxnSp>
+      <p:sp>
+        <p:nvSpPr>
+          <p:cNvPr id="99" name="TextBox 98">
+            <a:extLst>
+              <a:ext uri="{FF2B5EF4-FFF2-40B4-BE49-F238E27FC236}">
+                <a16:creationId xmlns:a16="http://schemas.microsoft.com/office/drawing/2014/main" id="{1A44B669-316F-E716-0E81-74C366328240}"/>
+              </a:ext>
+            </a:extLst>
+          </p:cNvPr>
+          <p:cNvSpPr txBox="1"/>
+          <p:nvPr/>
+        </p:nvSpPr>
+        <p:spPr>
+          <a:xfrm>
+            <a:off x="5027438" y="5483836"/>
+            <a:ext cx="3175356" cy="523220"/>
+          </a:xfrm>
+          <a:prstGeom prst="rect">
+            <a:avLst/>
+          </a:prstGeom>
+          <a:solidFill>
+            <a:schemeClr val="bg2"/>
+          </a:solidFill>
+          <a:ln w="19050">
+            <a:solidFill>
+              <a:schemeClr val="tx1"/>
+            </a:solidFill>
+          </a:ln>
+        </p:spPr>
+        <p:txBody>
+          <a:bodyPr wrap="none" rtlCol="0">
+            <a:spAutoFit/>
+          </a:bodyPr>
+          <a:lstStyle/>
+          <a:p>
+            <a:pPr marL="285750" indent="-285750">
+              <a:buFont typeface="Arial" panose="020B0604020202020204" pitchFamily="34" charset="0"/>
+              <a:buChar char="•"/>
+            </a:pPr>
+            <a:r>
+              <a:rPr lang="en-US" sz="1400" dirty="0"/>
+              <a:t>Oocyst reaching the system endpoint</a:t>
+            </a:r>
+          </a:p>
+          <a:p>
+            <a:pPr marL="285750" indent="-285750">
+              <a:buFont typeface="Arial" panose="020B0604020202020204" pitchFamily="34" charset="0"/>
+              <a:buChar char="•"/>
+            </a:pPr>
+            <a:r>
+              <a:rPr lang="en-US" sz="1400" dirty="0"/>
+              <a:t>Relative endpoint oocysts</a:t>
+            </a:r>
+          </a:p>
+        </p:txBody>
+      </p:sp>
+      <p:cxnSp>
+        <p:nvCxnSpPr>
+          <p:cNvPr id="101" name="Straight Arrow Connector 100">
+            <a:extLst>
+              <a:ext uri="{FF2B5EF4-FFF2-40B4-BE49-F238E27FC236}">
+                <a16:creationId xmlns:a16="http://schemas.microsoft.com/office/drawing/2014/main" id="{C216D989-9BD7-E0ED-8B83-A16DC0B72F94}"/>
+              </a:ext>
+            </a:extLst>
+          </p:cNvPr>
+          <p:cNvCxnSpPr>
+            <a:cxnSpLocks/>
+            <a:stCxn id="4" idx="2"/>
+            <a:endCxn id="99" idx="0"/>
+          </p:cNvCxnSpPr>
+          <p:nvPr/>
+        </p:nvCxnSpPr>
+        <p:spPr>
+          <a:xfrm flipH="1">
+            <a:off x="6615116" y="5299535"/>
+            <a:ext cx="1" cy="184301"/>
+          </a:xfrm>
+          <a:prstGeom prst="straightConnector1">
+            <a:avLst/>
+          </a:prstGeom>
+          <a:ln w="28575">
+            <a:tailEnd type="triangle"/>
+          </a:ln>
+        </p:spPr>
+        <p:style>
+          <a:lnRef idx="1">
+            <a:schemeClr val="dk1"/>
+          </a:lnRef>
+          <a:fillRef idx="0">
+            <a:schemeClr val="dk1"/>
+          </a:fillRef>
+          <a:effectRef idx="0">
+            <a:schemeClr val="dk1"/>
+          </a:effectRef>
+          <a:fontRef idx="minor">
+            <a:schemeClr val="tx1"/>
+          </a:fontRef>
+        </p:style>
+      </p:cxnSp>
+      <p:sp>
+        <p:nvSpPr>
+          <p:cNvPr id="6" name="TextBox 5">
+            <a:extLst>
+              <a:ext uri="{FF2B5EF4-FFF2-40B4-BE49-F238E27FC236}">
+                <a16:creationId xmlns:a16="http://schemas.microsoft.com/office/drawing/2014/main" id="{953267DB-6511-B0F5-7391-C54E02283496}"/>
+              </a:ext>
+            </a:extLst>
+          </p:cNvPr>
+          <p:cNvSpPr txBox="1"/>
+          <p:nvPr/>
+        </p:nvSpPr>
+        <p:spPr>
+          <a:xfrm>
+            <a:off x="2724936" y="3029296"/>
+            <a:ext cx="1526798" cy="253916"/>
+          </a:xfrm>
+          <a:prstGeom prst="rect">
+            <a:avLst/>
+          </a:prstGeom>
+          <a:solidFill>
+            <a:schemeClr val="bg1"/>
+          </a:solidFill>
+          <a:ln w="19050">
+            <a:solidFill>
+              <a:schemeClr val="tx1"/>
+            </a:solidFill>
+          </a:ln>
+        </p:spPr>
+        <p:txBody>
+          <a:bodyPr wrap="square" rtlCol="0" anchor="ctr">
+            <a:spAutoFit/>
+          </a:bodyPr>
+          <a:lstStyle/>
+          <a:p>
+            <a:pPr algn="ctr"/>
+            <a:r>
+              <a:rPr lang="en-US" sz="1050" dirty="0"/>
+              <a:t>Irrigation with water </a:t>
+            </a:r>
+          </a:p>
+        </p:txBody>
+      </p:sp>
+      <p:sp>
+        <p:nvSpPr>
+          <p:cNvPr id="7" name="Rectangle 6">
+            <a:extLst>
+              <a:ext uri="{FF2B5EF4-FFF2-40B4-BE49-F238E27FC236}">
+                <a16:creationId xmlns:a16="http://schemas.microsoft.com/office/drawing/2014/main" id="{564F0A21-2822-B227-EE15-F06E4393DF7C}"/>
+              </a:ext>
+            </a:extLst>
+          </p:cNvPr>
+          <p:cNvSpPr/>
+          <p:nvPr/>
+        </p:nvSpPr>
+        <p:spPr>
+          <a:xfrm>
+            <a:off x="2724938" y="2486024"/>
+            <a:ext cx="1526796" cy="338554"/>
+          </a:xfrm>
+          <a:prstGeom prst="rect">
+            <a:avLst/>
+          </a:prstGeom>
+          <a:solidFill>
+            <a:schemeClr val="bg1">
+              <a:lumMod val="75000"/>
+            </a:schemeClr>
+          </a:solidFill>
+          <a:ln>
+            <a:solidFill>
+              <a:schemeClr val="tx1">
+                <a:lumMod val="95000"/>
+                <a:lumOff val="5000"/>
+              </a:schemeClr>
+            </a:solidFill>
+          </a:ln>
+        </p:spPr>
+        <p:style>
+          <a:lnRef idx="2">
+            <a:schemeClr val="accent1">
+              <a:shade val="50000"/>
+            </a:schemeClr>
+          </a:lnRef>
+          <a:fillRef idx="1">
+            <a:schemeClr val="accent1"/>
+          </a:fillRef>
+          <a:effectRef idx="0">
+            <a:schemeClr val="accent1"/>
+          </a:effectRef>
+          <a:fontRef idx="minor">
+            <a:schemeClr val="lt1"/>
+          </a:fontRef>
+        </p:style>
+        <p:txBody>
+          <a:bodyPr rtlCol="0" anchor="ctr"/>
+          <a:lstStyle/>
+          <a:p>
+            <a:pPr algn="ctr"/>
+            <a:r>
+              <a:rPr lang="en-US" sz="1200" dirty="0">
+                <a:solidFill>
+                  <a:schemeClr val="tx1"/>
+                </a:solidFill>
+              </a:rPr>
+              <a:t>Irrigation Days</a:t>
+            </a:r>
+          </a:p>
+        </p:txBody>
+      </p:sp>
+      <p:cxnSp>
+        <p:nvCxnSpPr>
+          <p:cNvPr id="8" name="Straight Arrow Connector 7">
+            <a:extLst>
+              <a:ext uri="{FF2B5EF4-FFF2-40B4-BE49-F238E27FC236}">
+                <a16:creationId xmlns:a16="http://schemas.microsoft.com/office/drawing/2014/main" id="{EB0432BB-4F63-CA7C-F6CF-0857F0F865B7}"/>
+              </a:ext>
+            </a:extLst>
+          </p:cNvPr>
+          <p:cNvCxnSpPr>
+            <a:cxnSpLocks/>
+            <a:stCxn id="9" idx="2"/>
+            <a:endCxn id="14" idx="0"/>
+          </p:cNvCxnSpPr>
+          <p:nvPr/>
+        </p:nvCxnSpPr>
+        <p:spPr>
+          <a:xfrm>
+            <a:off x="5157195" y="2834011"/>
+            <a:ext cx="0" cy="178510"/>
+          </a:xfrm>
+          <a:prstGeom prst="straightConnector1">
+            <a:avLst/>
+          </a:prstGeom>
+          <a:ln w="28575">
+            <a:solidFill>
+              <a:schemeClr val="tx1"/>
+            </a:solidFill>
+            <a:tailEnd type="triangle"/>
+          </a:ln>
+        </p:spPr>
+        <p:style>
+          <a:lnRef idx="1">
+            <a:schemeClr val="accent1"/>
+          </a:lnRef>
+          <a:fillRef idx="0">
+            <a:schemeClr val="accent1"/>
+          </a:fillRef>
+          <a:effectRef idx="0">
+            <a:schemeClr val="accent1"/>
+          </a:effectRef>
+          <a:fontRef idx="minor">
+            <a:schemeClr val="tx1"/>
+          </a:fontRef>
+        </p:style>
+      </p:cxnSp>
+      <p:sp>
+        <p:nvSpPr>
+          <p:cNvPr id="9" name="Rectangle 8">
+            <a:extLst>
+              <a:ext uri="{FF2B5EF4-FFF2-40B4-BE49-F238E27FC236}">
+                <a16:creationId xmlns:a16="http://schemas.microsoft.com/office/drawing/2014/main" id="{CD4D91CA-7EBB-E5C6-BB90-680040C77A7F}"/>
+              </a:ext>
+            </a:extLst>
+          </p:cNvPr>
+          <p:cNvSpPr/>
+          <p:nvPr/>
+        </p:nvSpPr>
+        <p:spPr>
+          <a:xfrm>
+            <a:off x="4393797" y="2495457"/>
+            <a:ext cx="1526796" cy="338554"/>
+          </a:xfrm>
+          <a:prstGeom prst="rect">
+            <a:avLst/>
+          </a:prstGeom>
+          <a:solidFill>
+            <a:schemeClr val="bg1">
+              <a:lumMod val="75000"/>
+            </a:schemeClr>
+          </a:solidFill>
+          <a:ln>
+            <a:solidFill>
+              <a:schemeClr val="tx1">
+                <a:lumMod val="95000"/>
+                <a:lumOff val="5000"/>
+              </a:schemeClr>
+            </a:solidFill>
+          </a:ln>
+        </p:spPr>
+        <p:style>
+          <a:lnRef idx="2">
+            <a:schemeClr val="accent1">
+              <a:shade val="50000"/>
+            </a:schemeClr>
+          </a:lnRef>
+          <a:fillRef idx="1">
+            <a:schemeClr val="accent1"/>
+          </a:fillRef>
+          <a:effectRef idx="0">
+            <a:schemeClr val="accent1"/>
+          </a:effectRef>
+          <a:fontRef idx="minor">
+            <a:schemeClr val="lt1"/>
+          </a:fontRef>
+        </p:style>
+        <p:txBody>
+          <a:bodyPr rtlCol="0" anchor="ctr"/>
+          <a:lstStyle/>
+          <a:p>
+            <a:pPr algn="ctr"/>
+            <a:r>
+              <a:rPr lang="en-US" sz="1200" dirty="0">
+                <a:solidFill>
+                  <a:schemeClr val="tx1"/>
+                </a:solidFill>
+              </a:rPr>
+              <a:t>Water Testing?</a:t>
+            </a:r>
+          </a:p>
+        </p:txBody>
+      </p:sp>
+      <p:sp>
+        <p:nvSpPr>
+          <p:cNvPr id="10" name="TextBox 9">
+            <a:extLst>
+              <a:ext uri="{FF2B5EF4-FFF2-40B4-BE49-F238E27FC236}">
+                <a16:creationId xmlns:a16="http://schemas.microsoft.com/office/drawing/2014/main" id="{9BECCD27-EEC4-EBA5-4A5E-AA7232841603}"/>
+              </a:ext>
+            </a:extLst>
+          </p:cNvPr>
+          <p:cNvSpPr txBox="1"/>
+          <p:nvPr/>
+        </p:nvSpPr>
+        <p:spPr>
+          <a:xfrm>
+            <a:off x="4399239" y="4389177"/>
+            <a:ext cx="1526796" cy="261610"/>
+          </a:xfrm>
+          <a:prstGeom prst="rect">
+            <a:avLst/>
+          </a:prstGeom>
+          <a:solidFill>
+            <a:schemeClr val="bg1"/>
+          </a:solidFill>
+          <a:ln w="19050">
+            <a:solidFill>
+              <a:schemeClr val="tx1"/>
+            </a:solidFill>
+          </a:ln>
+        </p:spPr>
+        <p:txBody>
+          <a:bodyPr wrap="square" rtlCol="0" anchor="ctr">
+            <a:spAutoFit/>
+          </a:bodyPr>
+          <a:lstStyle/>
+          <a:p>
+            <a:pPr algn="ctr"/>
+            <a:r>
+              <a:rPr lang="en-US" sz="1050" dirty="0"/>
+              <a:t>Detection Yes/No</a:t>
+            </a:r>
+          </a:p>
+        </p:txBody>
+      </p:sp>
+      <p:sp>
+        <p:nvSpPr>
+          <p:cNvPr id="14" name="TextBox 13">
+            <a:extLst>
+              <a:ext uri="{FF2B5EF4-FFF2-40B4-BE49-F238E27FC236}">
+                <a16:creationId xmlns:a16="http://schemas.microsoft.com/office/drawing/2014/main" id="{D0E2D6E7-5FB9-8666-6DFD-0AFD2F5334E5}"/>
+              </a:ext>
+            </a:extLst>
+          </p:cNvPr>
+          <p:cNvSpPr txBox="1"/>
+          <p:nvPr/>
+        </p:nvSpPr>
+        <p:spPr>
+          <a:xfrm>
+            <a:off x="4393797" y="3012521"/>
+            <a:ext cx="1526796" cy="415498"/>
+          </a:xfrm>
+          <a:prstGeom prst="rect">
+            <a:avLst/>
+          </a:prstGeom>
+          <a:solidFill>
+            <a:schemeClr val="bg1"/>
+          </a:solidFill>
+          <a:ln w="19050">
+            <a:solidFill>
+              <a:schemeClr val="tx1"/>
+            </a:solidFill>
+          </a:ln>
+        </p:spPr>
+        <p:txBody>
+          <a:bodyPr wrap="square" rtlCol="0" anchor="ctr">
+            <a:spAutoFit/>
+          </a:bodyPr>
+          <a:lstStyle/>
+          <a:p>
+            <a:pPr algn="ctr"/>
+            <a:r>
+              <a:rPr lang="en-US" sz="1050" dirty="0"/>
+              <a:t>10 L Sample (s) collection</a:t>
+            </a:r>
+          </a:p>
+        </p:txBody>
+      </p:sp>
+      <p:sp>
+        <p:nvSpPr>
+          <p:cNvPr id="16" name="TextBox 15">
+            <a:extLst>
+              <a:ext uri="{FF2B5EF4-FFF2-40B4-BE49-F238E27FC236}">
+                <a16:creationId xmlns:a16="http://schemas.microsoft.com/office/drawing/2014/main" id="{E1CF6B7D-C194-556A-D7F8-AF395B581B8C}"/>
+              </a:ext>
+            </a:extLst>
+          </p:cNvPr>
+          <p:cNvSpPr txBox="1"/>
+          <p:nvPr/>
+        </p:nvSpPr>
+        <p:spPr>
+          <a:xfrm>
+            <a:off x="4393797" y="3580279"/>
+            <a:ext cx="1526796" cy="261610"/>
+          </a:xfrm>
+          <a:prstGeom prst="rect">
+            <a:avLst/>
+          </a:prstGeom>
+          <a:solidFill>
+            <a:schemeClr val="bg1"/>
+          </a:solidFill>
+          <a:ln w="19050">
+            <a:solidFill>
+              <a:schemeClr val="tx1"/>
+            </a:solidFill>
+          </a:ln>
+        </p:spPr>
+        <p:txBody>
+          <a:bodyPr wrap="square" rtlCol="0" anchor="ctr">
+            <a:spAutoFit/>
+          </a:bodyPr>
+          <a:lstStyle/>
+          <a:p>
+            <a:pPr algn="ctr"/>
+            <a:r>
+              <a:rPr lang="en-US" sz="1050" dirty="0"/>
+              <a:t>Sample filtration DEUF</a:t>
+            </a:r>
+          </a:p>
+        </p:txBody>
+      </p:sp>
+      <p:sp>
+        <p:nvSpPr>
+          <p:cNvPr id="17" name="TextBox 16">
+            <a:extLst>
+              <a:ext uri="{FF2B5EF4-FFF2-40B4-BE49-F238E27FC236}">
+                <a16:creationId xmlns:a16="http://schemas.microsoft.com/office/drawing/2014/main" id="{858AEA17-9A68-311E-1B10-95BF63E96A01}"/>
+              </a:ext>
+            </a:extLst>
+          </p:cNvPr>
+          <p:cNvSpPr txBox="1"/>
+          <p:nvPr/>
+        </p:nvSpPr>
+        <p:spPr>
+          <a:xfrm>
+            <a:off x="4395350" y="3983425"/>
+            <a:ext cx="1526796" cy="261610"/>
+          </a:xfrm>
+          <a:prstGeom prst="rect">
+            <a:avLst/>
+          </a:prstGeom>
+          <a:solidFill>
+            <a:schemeClr val="bg1"/>
+          </a:solidFill>
+          <a:ln w="19050">
+            <a:solidFill>
+              <a:schemeClr val="tx1"/>
+            </a:solidFill>
+          </a:ln>
+        </p:spPr>
+        <p:txBody>
+          <a:bodyPr wrap="square" rtlCol="0" anchor="ctr">
+            <a:spAutoFit/>
+          </a:bodyPr>
+          <a:lstStyle/>
+          <a:p>
+            <a:pPr algn="ctr"/>
+            <a:r>
+              <a:rPr lang="en-US" sz="1050" dirty="0"/>
+              <a:t>qPCR</a:t>
+            </a:r>
+          </a:p>
+        </p:txBody>
+      </p:sp>
+      <p:sp>
+        <p:nvSpPr>
+          <p:cNvPr id="18" name="TextBox 17">
+            <a:extLst>
+              <a:ext uri="{FF2B5EF4-FFF2-40B4-BE49-F238E27FC236}">
+                <a16:creationId xmlns:a16="http://schemas.microsoft.com/office/drawing/2014/main" id="{5C245120-DAB1-6EE6-8E7C-6B4635F11A15}"/>
+              </a:ext>
+            </a:extLst>
+          </p:cNvPr>
+          <p:cNvSpPr txBox="1"/>
+          <p:nvPr/>
+        </p:nvSpPr>
+        <p:spPr>
+          <a:xfrm>
+            <a:off x="4402343" y="4815108"/>
+            <a:ext cx="1526796" cy="415498"/>
+          </a:xfrm>
+          <a:prstGeom prst="rect">
+            <a:avLst/>
+          </a:prstGeom>
+          <a:solidFill>
+            <a:schemeClr val="bg1"/>
+          </a:solidFill>
+          <a:ln w="19050">
+            <a:solidFill>
+              <a:schemeClr val="tx1"/>
+            </a:solidFill>
+          </a:ln>
+        </p:spPr>
+        <p:txBody>
+          <a:bodyPr wrap="square" rtlCol="0" anchor="ctr">
+            <a:spAutoFit/>
+          </a:bodyPr>
+          <a:lstStyle/>
+          <a:p>
+            <a:pPr algn="ctr"/>
+            <a:r>
+              <a:rPr lang="en-US" sz="1050" dirty="0"/>
+              <a:t>Action taken product not contaminated</a:t>
+            </a:r>
+          </a:p>
+        </p:txBody>
+      </p:sp>
+      <p:sp>
+        <p:nvSpPr>
+          <p:cNvPr id="31" name="TextBox 30">
+            <a:extLst>
+              <a:ext uri="{FF2B5EF4-FFF2-40B4-BE49-F238E27FC236}">
+                <a16:creationId xmlns:a16="http://schemas.microsoft.com/office/drawing/2014/main" id="{FD9152AC-3B37-70C0-FA89-3B249908693C}"/>
+              </a:ext>
+            </a:extLst>
+          </p:cNvPr>
+          <p:cNvSpPr txBox="1"/>
+          <p:nvPr/>
+        </p:nvSpPr>
+        <p:spPr>
+          <a:xfrm>
+            <a:off x="2721392" y="3948697"/>
+            <a:ext cx="1526798" cy="253916"/>
+          </a:xfrm>
+          <a:prstGeom prst="rect">
+            <a:avLst/>
+          </a:prstGeom>
+          <a:solidFill>
+            <a:schemeClr val="bg1"/>
+          </a:solidFill>
+          <a:ln w="19050">
+            <a:solidFill>
+              <a:schemeClr val="tx1"/>
+            </a:solidFill>
+          </a:ln>
+        </p:spPr>
+        <p:txBody>
+          <a:bodyPr wrap="square" rtlCol="0" anchor="ctr">
+            <a:spAutoFit/>
+          </a:bodyPr>
+          <a:lstStyle/>
+          <a:p>
+            <a:pPr algn="ctr"/>
+            <a:r>
+              <a:rPr lang="en-US" sz="1050" dirty="0"/>
+              <a:t>Contamination Event</a:t>
+            </a:r>
+          </a:p>
+        </p:txBody>
+      </p:sp>
+      <p:sp>
+        <p:nvSpPr>
+          <p:cNvPr id="32" name="Rectangle 31">
+            <a:extLst>
+              <a:ext uri="{FF2B5EF4-FFF2-40B4-BE49-F238E27FC236}">
+                <a16:creationId xmlns:a16="http://schemas.microsoft.com/office/drawing/2014/main" id="{CD81D3D9-2F27-51D6-23D7-64C1C1B33835}"/>
+              </a:ext>
+            </a:extLst>
+          </p:cNvPr>
+          <p:cNvSpPr/>
+          <p:nvPr/>
+        </p:nvSpPr>
+        <p:spPr>
+          <a:xfrm>
+            <a:off x="2721809" y="3440082"/>
+            <a:ext cx="1526796" cy="338554"/>
+          </a:xfrm>
+          <a:prstGeom prst="rect">
+            <a:avLst/>
+          </a:prstGeom>
+          <a:solidFill>
+            <a:schemeClr val="bg1">
+              <a:lumMod val="75000"/>
+            </a:schemeClr>
+          </a:solidFill>
+          <a:ln>
+            <a:solidFill>
+              <a:schemeClr val="tx1">
+                <a:lumMod val="95000"/>
+                <a:lumOff val="5000"/>
+              </a:schemeClr>
+            </a:solidFill>
+          </a:ln>
+        </p:spPr>
+        <p:style>
+          <a:lnRef idx="2">
+            <a:schemeClr val="accent1">
+              <a:shade val="50000"/>
+            </a:schemeClr>
+          </a:lnRef>
+          <a:fillRef idx="1">
+            <a:schemeClr val="accent1"/>
+          </a:fillRef>
+          <a:effectRef idx="0">
+            <a:schemeClr val="accent1"/>
+          </a:effectRef>
+          <a:fontRef idx="minor">
+            <a:schemeClr val="lt1"/>
+          </a:fontRef>
+        </p:style>
+        <p:txBody>
+          <a:bodyPr rtlCol="0" anchor="ctr"/>
+          <a:lstStyle/>
+          <a:p>
+            <a:pPr algn="ctr"/>
+            <a:r>
+              <a:rPr lang="en-US" sz="1100" dirty="0">
+                <a:solidFill>
+                  <a:schemeClr val="tx1"/>
+                </a:solidFill>
+              </a:rPr>
+              <a:t>Is water Contaminated?</a:t>
+            </a:r>
+          </a:p>
+        </p:txBody>
+      </p:sp>
+      <p:cxnSp>
+        <p:nvCxnSpPr>
+          <p:cNvPr id="35" name="Straight Arrow Connector 34">
+            <a:extLst>
+              <a:ext uri="{FF2B5EF4-FFF2-40B4-BE49-F238E27FC236}">
+                <a16:creationId xmlns:a16="http://schemas.microsoft.com/office/drawing/2014/main" id="{2973B5E8-1A4B-0F91-C10F-B712866933A5}"/>
+              </a:ext>
+            </a:extLst>
+          </p:cNvPr>
+          <p:cNvCxnSpPr>
+            <a:cxnSpLocks/>
+            <a:stCxn id="6" idx="2"/>
+            <a:endCxn id="32" idx="0"/>
+          </p:cNvCxnSpPr>
+          <p:nvPr/>
+        </p:nvCxnSpPr>
+        <p:spPr>
+          <a:xfrm flipH="1">
+            <a:off x="3485207" y="3283212"/>
+            <a:ext cx="3128" cy="156870"/>
+          </a:xfrm>
+          <a:prstGeom prst="straightConnector1">
+            <a:avLst/>
+          </a:prstGeom>
+          <a:ln w="28575">
+            <a:solidFill>
+              <a:schemeClr val="tx1"/>
+            </a:solidFill>
+            <a:tailEnd type="triangle"/>
+          </a:ln>
+        </p:spPr>
+        <p:style>
+          <a:lnRef idx="1">
+            <a:schemeClr val="accent1"/>
+          </a:lnRef>
+          <a:fillRef idx="0">
+            <a:schemeClr val="accent1"/>
+          </a:fillRef>
+          <a:effectRef idx="0">
+            <a:schemeClr val="accent1"/>
+          </a:effectRef>
+          <a:fontRef idx="minor">
+            <a:schemeClr val="tx1"/>
+          </a:fontRef>
+        </p:style>
+      </p:cxnSp>
+      <p:cxnSp>
+        <p:nvCxnSpPr>
+          <p:cNvPr id="39" name="Straight Arrow Connector 38">
+            <a:extLst>
+              <a:ext uri="{FF2B5EF4-FFF2-40B4-BE49-F238E27FC236}">
+                <a16:creationId xmlns:a16="http://schemas.microsoft.com/office/drawing/2014/main" id="{DE676E70-E344-8A3B-1577-9EE6CDD42290}"/>
+              </a:ext>
+            </a:extLst>
+          </p:cNvPr>
+          <p:cNvCxnSpPr>
+            <a:cxnSpLocks/>
+            <a:stCxn id="32" idx="2"/>
+            <a:endCxn id="31" idx="0"/>
+          </p:cNvCxnSpPr>
+          <p:nvPr/>
+        </p:nvCxnSpPr>
+        <p:spPr>
+          <a:xfrm flipH="1">
+            <a:off x="3484791" y="3778636"/>
+            <a:ext cx="416" cy="170061"/>
+          </a:xfrm>
+          <a:prstGeom prst="straightConnector1">
+            <a:avLst/>
+          </a:prstGeom>
+          <a:ln w="28575">
+            <a:solidFill>
+              <a:schemeClr val="tx1"/>
+            </a:solidFill>
+            <a:tailEnd type="triangle"/>
+          </a:ln>
+        </p:spPr>
+        <p:style>
+          <a:lnRef idx="1">
+            <a:schemeClr val="accent1"/>
+          </a:lnRef>
+          <a:fillRef idx="0">
+            <a:schemeClr val="accent1"/>
+          </a:fillRef>
+          <a:effectRef idx="0">
+            <a:schemeClr val="accent1"/>
+          </a:effectRef>
+          <a:fontRef idx="minor">
+            <a:schemeClr val="tx1"/>
+          </a:fontRef>
+        </p:style>
+      </p:cxnSp>
+      <p:sp>
+        <p:nvSpPr>
+          <p:cNvPr id="45" name="Rectangle 44">
+            <a:extLst>
+              <a:ext uri="{FF2B5EF4-FFF2-40B4-BE49-F238E27FC236}">
+                <a16:creationId xmlns:a16="http://schemas.microsoft.com/office/drawing/2014/main" id="{6F42F627-9F92-2BA7-1BDF-E5BB0893C0F2}"/>
+              </a:ext>
+            </a:extLst>
+          </p:cNvPr>
+          <p:cNvSpPr/>
+          <p:nvPr/>
+        </p:nvSpPr>
+        <p:spPr>
+          <a:xfrm>
+            <a:off x="8983310" y="2514241"/>
+            <a:ext cx="1526796" cy="338554"/>
+          </a:xfrm>
+          <a:prstGeom prst="rect">
+            <a:avLst/>
+          </a:prstGeom>
+          <a:solidFill>
+            <a:schemeClr val="bg1">
+              <a:lumMod val="75000"/>
+            </a:schemeClr>
+          </a:solidFill>
+          <a:ln>
+            <a:solidFill>
+              <a:schemeClr val="tx1">
+                <a:lumMod val="95000"/>
+                <a:lumOff val="5000"/>
+              </a:schemeClr>
+            </a:solidFill>
+          </a:ln>
+        </p:spPr>
+        <p:style>
+          <a:lnRef idx="2">
+            <a:schemeClr val="accent1">
+              <a:shade val="50000"/>
+            </a:schemeClr>
+          </a:lnRef>
+          <a:fillRef idx="1">
+            <a:schemeClr val="accent1"/>
+          </a:fillRef>
+          <a:effectRef idx="0">
+            <a:schemeClr val="accent1"/>
+          </a:effectRef>
+          <a:fontRef idx="minor">
+            <a:schemeClr val="lt1"/>
+          </a:fontRef>
+        </p:style>
+        <p:txBody>
+          <a:bodyPr rtlCol="0" anchor="ctr"/>
+          <a:lstStyle/>
+          <a:p>
+            <a:pPr algn="ctr"/>
+            <a:r>
+              <a:rPr lang="en-US" sz="1200" dirty="0">
+                <a:solidFill>
+                  <a:schemeClr val="tx1"/>
+                </a:solidFill>
+              </a:rPr>
+              <a:t>Product Testing </a:t>
+            </a:r>
+          </a:p>
+        </p:txBody>
+      </p:sp>
+      <p:cxnSp>
+        <p:nvCxnSpPr>
+          <p:cNvPr id="49" name="Straight Arrow Connector 48">
+            <a:extLst>
+              <a:ext uri="{FF2B5EF4-FFF2-40B4-BE49-F238E27FC236}">
+                <a16:creationId xmlns:a16="http://schemas.microsoft.com/office/drawing/2014/main" id="{A9282CCF-F24A-6747-FCBA-0BC68230C558}"/>
+              </a:ext>
+            </a:extLst>
+          </p:cNvPr>
+          <p:cNvCxnSpPr>
+            <a:cxnSpLocks/>
+            <a:stCxn id="82" idx="2"/>
+            <a:endCxn id="78" idx="0"/>
+          </p:cNvCxnSpPr>
+          <p:nvPr/>
+        </p:nvCxnSpPr>
+        <p:spPr>
+          <a:xfrm flipH="1">
+            <a:off x="9735058" y="4155777"/>
+            <a:ext cx="11650" cy="116279"/>
+          </a:xfrm>
+          <a:prstGeom prst="straightConnector1">
+            <a:avLst/>
+          </a:prstGeom>
+          <a:ln w="28575">
+            <a:solidFill>
+              <a:schemeClr val="tx1"/>
+            </a:solidFill>
+            <a:tailEnd type="triangle"/>
+          </a:ln>
+        </p:spPr>
+        <p:style>
+          <a:lnRef idx="1">
+            <a:schemeClr val="accent1"/>
+          </a:lnRef>
+          <a:fillRef idx="0">
+            <a:schemeClr val="accent1"/>
+          </a:fillRef>
+          <a:effectRef idx="0">
+            <a:schemeClr val="accent1"/>
+          </a:effectRef>
+          <a:fontRef idx="minor">
+            <a:schemeClr val="tx1"/>
+          </a:fontRef>
+        </p:style>
+      </p:cxnSp>
+      <p:cxnSp>
+        <p:nvCxnSpPr>
+          <p:cNvPr id="53" name="Straight Arrow Connector 52">
+            <a:extLst>
+              <a:ext uri="{FF2B5EF4-FFF2-40B4-BE49-F238E27FC236}">
+                <a16:creationId xmlns:a16="http://schemas.microsoft.com/office/drawing/2014/main" id="{66ADDB54-A57D-9645-6823-C1277E5AC1D8}"/>
+              </a:ext>
+            </a:extLst>
+          </p:cNvPr>
+          <p:cNvCxnSpPr>
+            <a:cxnSpLocks/>
+            <a:stCxn id="81" idx="2"/>
+            <a:endCxn id="82" idx="0"/>
+          </p:cNvCxnSpPr>
+          <p:nvPr/>
+        </p:nvCxnSpPr>
+        <p:spPr>
+          <a:xfrm>
+            <a:off x="9746708" y="3780511"/>
+            <a:ext cx="0" cy="113656"/>
+          </a:xfrm>
+          <a:prstGeom prst="straightConnector1">
+            <a:avLst/>
+          </a:prstGeom>
+          <a:ln w="28575">
+            <a:solidFill>
+              <a:schemeClr val="tx1"/>
+            </a:solidFill>
+            <a:tailEnd type="triangle"/>
+          </a:ln>
+        </p:spPr>
+        <p:style>
+          <a:lnRef idx="1">
+            <a:schemeClr val="accent1"/>
+          </a:lnRef>
+          <a:fillRef idx="0">
+            <a:schemeClr val="accent1"/>
+          </a:fillRef>
+          <a:effectRef idx="0">
+            <a:schemeClr val="accent1"/>
+          </a:effectRef>
+          <a:fontRef idx="minor">
+            <a:schemeClr val="tx1"/>
+          </a:fontRef>
+        </p:style>
+      </p:cxnSp>
+      <p:cxnSp>
+        <p:nvCxnSpPr>
+          <p:cNvPr id="57" name="Straight Arrow Connector 56">
+            <a:extLst>
+              <a:ext uri="{FF2B5EF4-FFF2-40B4-BE49-F238E27FC236}">
+                <a16:creationId xmlns:a16="http://schemas.microsoft.com/office/drawing/2014/main" id="{08CA0C6A-72FB-2D2F-A7B3-C1112FADBE0F}"/>
+              </a:ext>
+            </a:extLst>
+          </p:cNvPr>
+          <p:cNvCxnSpPr>
+            <a:cxnSpLocks/>
+            <a:stCxn id="80" idx="2"/>
+            <a:endCxn id="81" idx="0"/>
+          </p:cNvCxnSpPr>
+          <p:nvPr/>
+        </p:nvCxnSpPr>
+        <p:spPr>
+          <a:xfrm flipH="1">
+            <a:off x="9746708" y="3395847"/>
+            <a:ext cx="234" cy="130748"/>
+          </a:xfrm>
+          <a:prstGeom prst="straightConnector1">
+            <a:avLst/>
+          </a:prstGeom>
+          <a:ln w="28575">
+            <a:solidFill>
+              <a:schemeClr val="tx1"/>
+            </a:solidFill>
+            <a:tailEnd type="triangle"/>
+          </a:ln>
+        </p:spPr>
+        <p:style>
+          <a:lnRef idx="1">
+            <a:schemeClr val="accent1"/>
+          </a:lnRef>
+          <a:fillRef idx="0">
+            <a:schemeClr val="accent1"/>
+          </a:fillRef>
+          <a:effectRef idx="0">
+            <a:schemeClr val="accent1"/>
+          </a:effectRef>
+          <a:fontRef idx="minor">
+            <a:schemeClr val="tx1"/>
+          </a:fontRef>
+        </p:style>
+      </p:cxnSp>
+      <p:cxnSp>
+        <p:nvCxnSpPr>
+          <p:cNvPr id="60" name="Straight Arrow Connector 59">
+            <a:extLst>
+              <a:ext uri="{FF2B5EF4-FFF2-40B4-BE49-F238E27FC236}">
+                <a16:creationId xmlns:a16="http://schemas.microsoft.com/office/drawing/2014/main" id="{79775602-6A70-E620-AF83-4D6AC3646E71}"/>
+              </a:ext>
+            </a:extLst>
+          </p:cNvPr>
+          <p:cNvCxnSpPr>
+            <a:cxnSpLocks/>
+            <a:stCxn id="45" idx="2"/>
+            <a:endCxn id="80" idx="0"/>
+          </p:cNvCxnSpPr>
+          <p:nvPr/>
+        </p:nvCxnSpPr>
+        <p:spPr>
+          <a:xfrm>
+            <a:off x="9746708" y="2852795"/>
+            <a:ext cx="234" cy="127554"/>
+          </a:xfrm>
+          <a:prstGeom prst="straightConnector1">
+            <a:avLst/>
+          </a:prstGeom>
+          <a:ln w="28575">
+            <a:solidFill>
+              <a:schemeClr val="tx1"/>
+            </a:solidFill>
+            <a:tailEnd type="triangle"/>
+          </a:ln>
+        </p:spPr>
+        <p:style>
+          <a:lnRef idx="1">
+            <a:schemeClr val="accent1"/>
+          </a:lnRef>
+          <a:fillRef idx="0">
+            <a:schemeClr val="accent1"/>
+          </a:fillRef>
+          <a:effectRef idx="0">
+            <a:schemeClr val="accent1"/>
+          </a:effectRef>
+          <a:fontRef idx="minor">
+            <a:schemeClr val="tx1"/>
+          </a:fontRef>
+        </p:style>
+      </p:cxnSp>
+      <p:cxnSp>
+        <p:nvCxnSpPr>
+          <p:cNvPr id="98" name="Straight Arrow Connector 97">
+            <a:extLst>
+              <a:ext uri="{FF2B5EF4-FFF2-40B4-BE49-F238E27FC236}">
+                <a16:creationId xmlns:a16="http://schemas.microsoft.com/office/drawing/2014/main" id="{77A0D91F-819C-6A4C-9F23-330FD930E703}"/>
+              </a:ext>
+            </a:extLst>
+          </p:cNvPr>
+          <p:cNvCxnSpPr>
+            <a:cxnSpLocks/>
+            <a:stCxn id="14" idx="2"/>
+            <a:endCxn id="16" idx="0"/>
+          </p:cNvCxnSpPr>
+          <p:nvPr/>
+        </p:nvCxnSpPr>
+        <p:spPr>
+          <a:xfrm>
+            <a:off x="5157195" y="3428019"/>
+            <a:ext cx="0" cy="152260"/>
+          </a:xfrm>
+          <a:prstGeom prst="straightConnector1">
+            <a:avLst/>
+          </a:prstGeom>
+          <a:ln w="28575">
+            <a:solidFill>
+              <a:schemeClr val="tx1"/>
+            </a:solidFill>
+            <a:tailEnd type="triangle"/>
+          </a:ln>
+        </p:spPr>
+        <p:style>
+          <a:lnRef idx="1">
+            <a:schemeClr val="accent1"/>
+          </a:lnRef>
+          <a:fillRef idx="0">
+            <a:schemeClr val="accent1"/>
+          </a:fillRef>
+          <a:effectRef idx="0">
+            <a:schemeClr val="accent1"/>
+          </a:effectRef>
+          <a:fontRef idx="minor">
+            <a:schemeClr val="tx1"/>
+          </a:fontRef>
+        </p:style>
+      </p:cxnSp>
+      <p:cxnSp>
+        <p:nvCxnSpPr>
+          <p:cNvPr id="105" name="Straight Arrow Connector 104">
+            <a:extLst>
+              <a:ext uri="{FF2B5EF4-FFF2-40B4-BE49-F238E27FC236}">
+                <a16:creationId xmlns:a16="http://schemas.microsoft.com/office/drawing/2014/main" id="{46649CF4-4309-8016-0A98-D0D02470E6FC}"/>
+              </a:ext>
+            </a:extLst>
+          </p:cNvPr>
+          <p:cNvCxnSpPr>
+            <a:cxnSpLocks/>
+            <a:stCxn id="16" idx="2"/>
+            <a:endCxn id="17" idx="0"/>
+          </p:cNvCxnSpPr>
+          <p:nvPr/>
+        </p:nvCxnSpPr>
+        <p:spPr>
+          <a:xfrm>
+            <a:off x="5157195" y="3841889"/>
+            <a:ext cx="1553" cy="141536"/>
+          </a:xfrm>
+          <a:prstGeom prst="straightConnector1">
+            <a:avLst/>
+          </a:prstGeom>
+          <a:ln w="28575">
+            <a:solidFill>
+              <a:schemeClr val="tx1"/>
+            </a:solidFill>
+            <a:tailEnd type="triangle"/>
+          </a:ln>
+        </p:spPr>
+        <p:style>
+          <a:lnRef idx="1">
+            <a:schemeClr val="accent1"/>
+          </a:lnRef>
+          <a:fillRef idx="0">
+            <a:schemeClr val="accent1"/>
+          </a:fillRef>
+          <a:effectRef idx="0">
+            <a:schemeClr val="accent1"/>
+          </a:effectRef>
+          <a:fontRef idx="minor">
+            <a:schemeClr val="tx1"/>
+          </a:fontRef>
+        </p:style>
+      </p:cxnSp>
+      <p:cxnSp>
+        <p:nvCxnSpPr>
+          <p:cNvPr id="109" name="Straight Arrow Connector 108">
+            <a:extLst>
+              <a:ext uri="{FF2B5EF4-FFF2-40B4-BE49-F238E27FC236}">
+                <a16:creationId xmlns:a16="http://schemas.microsoft.com/office/drawing/2014/main" id="{9B5916E2-4576-B1C6-A795-8038F8D17510}"/>
+              </a:ext>
+            </a:extLst>
+          </p:cNvPr>
+          <p:cNvCxnSpPr>
+            <a:cxnSpLocks/>
+            <a:stCxn id="17" idx="2"/>
+            <a:endCxn id="10" idx="0"/>
+          </p:cNvCxnSpPr>
+          <p:nvPr/>
+        </p:nvCxnSpPr>
+        <p:spPr>
+          <a:xfrm>
+            <a:off x="5158748" y="4245035"/>
+            <a:ext cx="3889" cy="144142"/>
+          </a:xfrm>
+          <a:prstGeom prst="straightConnector1">
+            <a:avLst/>
+          </a:prstGeom>
+          <a:ln w="28575">
+            <a:solidFill>
+              <a:schemeClr val="tx1"/>
+            </a:solidFill>
+            <a:tailEnd type="triangle"/>
+          </a:ln>
+        </p:spPr>
+        <p:style>
+          <a:lnRef idx="1">
+            <a:schemeClr val="accent1"/>
+          </a:lnRef>
+          <a:fillRef idx="0">
+            <a:schemeClr val="accent1"/>
+          </a:fillRef>
+          <a:effectRef idx="0">
+            <a:schemeClr val="accent1"/>
+          </a:effectRef>
+          <a:fontRef idx="minor">
+            <a:schemeClr val="tx1"/>
+          </a:fontRef>
+        </p:style>
+      </p:cxnSp>
+      <p:cxnSp>
+        <p:nvCxnSpPr>
+          <p:cNvPr id="115" name="Straight Arrow Connector 114">
+            <a:extLst>
+              <a:ext uri="{FF2B5EF4-FFF2-40B4-BE49-F238E27FC236}">
+                <a16:creationId xmlns:a16="http://schemas.microsoft.com/office/drawing/2014/main" id="{34781017-3FEC-D2B4-AA8D-5774C087421E}"/>
+              </a:ext>
+            </a:extLst>
+          </p:cNvPr>
+          <p:cNvCxnSpPr>
+            <a:cxnSpLocks/>
+            <a:stCxn id="54" idx="2"/>
+            <a:endCxn id="62" idx="0"/>
+          </p:cNvCxnSpPr>
+          <p:nvPr/>
+        </p:nvCxnSpPr>
+        <p:spPr>
+          <a:xfrm>
+            <a:off x="6838146" y="2836236"/>
+            <a:ext cx="3104" cy="138248"/>
+          </a:xfrm>
+          <a:prstGeom prst="straightConnector1">
+            <a:avLst/>
+          </a:prstGeom>
+          <a:ln w="28575">
+            <a:solidFill>
+              <a:schemeClr val="tx1"/>
+            </a:solidFill>
+            <a:tailEnd type="triangle"/>
+          </a:ln>
+        </p:spPr>
+        <p:style>
+          <a:lnRef idx="1">
+            <a:schemeClr val="accent1"/>
+          </a:lnRef>
+          <a:fillRef idx="0">
+            <a:schemeClr val="accent1"/>
+          </a:fillRef>
+          <a:effectRef idx="0">
+            <a:schemeClr val="accent1"/>
+          </a:effectRef>
+          <a:fontRef idx="minor">
+            <a:schemeClr val="tx1"/>
+          </a:fontRef>
+        </p:style>
+      </p:cxnSp>
+      <p:cxnSp>
+        <p:nvCxnSpPr>
+          <p:cNvPr id="119" name="Straight Arrow Connector 118">
+            <a:extLst>
+              <a:ext uri="{FF2B5EF4-FFF2-40B4-BE49-F238E27FC236}">
+                <a16:creationId xmlns:a16="http://schemas.microsoft.com/office/drawing/2014/main" id="{48393107-2740-AA13-5F5D-817828F101DF}"/>
+              </a:ext>
+            </a:extLst>
+          </p:cNvPr>
+          <p:cNvCxnSpPr>
+            <a:cxnSpLocks/>
+            <a:stCxn id="62" idx="2"/>
+            <a:endCxn id="63" idx="0"/>
+          </p:cNvCxnSpPr>
+          <p:nvPr/>
+        </p:nvCxnSpPr>
+        <p:spPr>
+          <a:xfrm>
+            <a:off x="6841250" y="3389982"/>
+            <a:ext cx="0" cy="130740"/>
+          </a:xfrm>
+          <a:prstGeom prst="straightConnector1">
+            <a:avLst/>
+          </a:prstGeom>
+          <a:ln w="28575">
+            <a:solidFill>
+              <a:schemeClr val="tx1"/>
+            </a:solidFill>
+            <a:tailEnd type="triangle"/>
+          </a:ln>
+        </p:spPr>
+        <p:style>
+          <a:lnRef idx="1">
+            <a:schemeClr val="accent1"/>
+          </a:lnRef>
+          <a:fillRef idx="0">
+            <a:schemeClr val="accent1"/>
+          </a:fillRef>
+          <a:effectRef idx="0">
+            <a:schemeClr val="accent1"/>
+          </a:effectRef>
+          <a:fontRef idx="minor">
+            <a:schemeClr val="tx1"/>
+          </a:fontRef>
+        </p:style>
+      </p:cxnSp>
+      <p:cxnSp>
+        <p:nvCxnSpPr>
+          <p:cNvPr id="122" name="Straight Arrow Connector 121">
+            <a:extLst>
+              <a:ext uri="{FF2B5EF4-FFF2-40B4-BE49-F238E27FC236}">
+                <a16:creationId xmlns:a16="http://schemas.microsoft.com/office/drawing/2014/main" id="{A756387C-5C70-7562-3602-72D0979BE83E}"/>
+              </a:ext>
+            </a:extLst>
+          </p:cNvPr>
+          <p:cNvCxnSpPr>
+            <a:cxnSpLocks/>
+            <a:stCxn id="63" idx="2"/>
+            <a:endCxn id="64" idx="0"/>
+          </p:cNvCxnSpPr>
+          <p:nvPr/>
+        </p:nvCxnSpPr>
+        <p:spPr>
+          <a:xfrm>
+            <a:off x="6841250" y="3774638"/>
+            <a:ext cx="0" cy="139294"/>
+          </a:xfrm>
+          <a:prstGeom prst="straightConnector1">
+            <a:avLst/>
+          </a:prstGeom>
+          <a:ln w="28575">
+            <a:solidFill>
+              <a:schemeClr val="tx1"/>
+            </a:solidFill>
+            <a:tailEnd type="triangle"/>
+          </a:ln>
+        </p:spPr>
+        <p:style>
+          <a:lnRef idx="1">
+            <a:schemeClr val="accent1"/>
+          </a:lnRef>
+          <a:fillRef idx="0">
+            <a:schemeClr val="accent1"/>
+          </a:fillRef>
+          <a:effectRef idx="0">
+            <a:schemeClr val="accent1"/>
+          </a:effectRef>
+          <a:fontRef idx="minor">
+            <a:schemeClr val="tx1"/>
+          </a:fontRef>
+        </p:style>
+      </p:cxnSp>
+      <p:cxnSp>
+        <p:nvCxnSpPr>
+          <p:cNvPr id="125" name="Straight Arrow Connector 124">
+            <a:extLst>
+              <a:ext uri="{FF2B5EF4-FFF2-40B4-BE49-F238E27FC236}">
+                <a16:creationId xmlns:a16="http://schemas.microsoft.com/office/drawing/2014/main" id="{8FA9E9AA-8032-A9CB-D97F-F8202451AD7E}"/>
+              </a:ext>
+            </a:extLst>
+          </p:cNvPr>
+          <p:cNvCxnSpPr>
+            <a:cxnSpLocks/>
+            <a:stCxn id="64" idx="2"/>
+            <a:endCxn id="61" idx="0"/>
+          </p:cNvCxnSpPr>
+          <p:nvPr/>
+        </p:nvCxnSpPr>
+        <p:spPr>
+          <a:xfrm flipH="1">
+            <a:off x="6838146" y="4175542"/>
+            <a:ext cx="3104" cy="133371"/>
+          </a:xfrm>
+          <a:prstGeom prst="straightConnector1">
+            <a:avLst/>
+          </a:prstGeom>
+          <a:ln w="28575">
+            <a:solidFill>
+              <a:schemeClr val="tx1"/>
+            </a:solidFill>
+            <a:tailEnd type="triangle"/>
+          </a:ln>
+        </p:spPr>
+        <p:style>
+          <a:lnRef idx="1">
+            <a:schemeClr val="accent1"/>
+          </a:lnRef>
+          <a:fillRef idx="0">
+            <a:schemeClr val="accent1"/>
+          </a:fillRef>
+          <a:effectRef idx="0">
+            <a:schemeClr val="accent1"/>
+          </a:effectRef>
+          <a:fontRef idx="minor">
+            <a:schemeClr val="tx1"/>
+          </a:fontRef>
+        </p:style>
+      </p:cxnSp>
+      <p:sp>
+        <p:nvSpPr>
+          <p:cNvPr id="135" name="Rectangle 134">
+            <a:extLst>
+              <a:ext uri="{FF2B5EF4-FFF2-40B4-BE49-F238E27FC236}">
+                <a16:creationId xmlns:a16="http://schemas.microsoft.com/office/drawing/2014/main" id="{6401EC45-E4BE-7B89-A27B-A18034D25022}"/>
+              </a:ext>
+            </a:extLst>
+          </p:cNvPr>
+          <p:cNvSpPr/>
+          <p:nvPr/>
+        </p:nvSpPr>
+        <p:spPr>
+          <a:xfrm>
+            <a:off x="596403" y="2826103"/>
+            <a:ext cx="1428362" cy="807737"/>
+          </a:xfrm>
+          <a:prstGeom prst="rect">
+            <a:avLst/>
+          </a:prstGeom>
+          <a:solidFill>
+            <a:schemeClr val="bg1">
+              <a:lumMod val="75000"/>
+            </a:schemeClr>
+          </a:solidFill>
+          <a:ln>
+            <a:solidFill>
+              <a:schemeClr val="tx1">
+                <a:lumMod val="95000"/>
+                <a:lumOff val="5000"/>
+              </a:schemeClr>
+            </a:solidFill>
+          </a:ln>
+        </p:spPr>
+        <p:style>
+          <a:lnRef idx="2">
+            <a:schemeClr val="accent1">
+              <a:shade val="50000"/>
+            </a:schemeClr>
+          </a:lnRef>
+          <a:fillRef idx="1">
+            <a:schemeClr val="accent1"/>
+          </a:fillRef>
+          <a:effectRef idx="0">
+            <a:schemeClr val="accent1"/>
+          </a:effectRef>
+          <a:fontRef idx="minor">
+            <a:schemeClr val="lt1"/>
+          </a:fontRef>
+        </p:style>
+        <p:txBody>
+          <a:bodyPr rtlCol="0" anchor="t"/>
+          <a:lstStyle/>
+          <a:p>
+            <a:pPr marL="171450" indent="-171450">
+              <a:buFont typeface="Arial" panose="020B0604020202020204" pitchFamily="34" charset="0"/>
+              <a:buChar char="•"/>
+            </a:pPr>
+            <a:r>
+              <a:rPr lang="en-US" sz="1100" dirty="0">
+                <a:solidFill>
+                  <a:schemeClr val="tx1"/>
+                </a:solidFill>
+              </a:rPr>
+              <a:t>Low Level: 0.6 oocysts per liter</a:t>
+            </a:r>
+          </a:p>
+          <a:p>
+            <a:pPr marL="171450" indent="-171450">
+              <a:buFont typeface="Arial" panose="020B0604020202020204" pitchFamily="34" charset="0"/>
+              <a:buChar char="•"/>
+            </a:pPr>
+            <a:r>
+              <a:rPr lang="en-US" sz="1100" dirty="0">
+                <a:solidFill>
+                  <a:schemeClr val="tx1"/>
+                </a:solidFill>
+              </a:rPr>
+              <a:t>High Level: 20 oocysts per liter</a:t>
+            </a:r>
+          </a:p>
+          <a:p>
+            <a:endParaRPr lang="en-US" sz="1100" dirty="0">
+              <a:solidFill>
+                <a:schemeClr val="tx1"/>
+              </a:solidFill>
+            </a:endParaRPr>
+          </a:p>
+        </p:txBody>
+      </p:sp>
+      <p:sp>
+        <p:nvSpPr>
+          <p:cNvPr id="138" name="Rectangle 137">
+            <a:extLst>
+              <a:ext uri="{FF2B5EF4-FFF2-40B4-BE49-F238E27FC236}">
+                <a16:creationId xmlns:a16="http://schemas.microsoft.com/office/drawing/2014/main" id="{DB7EE64A-6FDE-4492-B584-287582233A63}"/>
+              </a:ext>
+            </a:extLst>
+          </p:cNvPr>
+          <p:cNvSpPr/>
+          <p:nvPr/>
+        </p:nvSpPr>
+        <p:spPr>
+          <a:xfrm>
+            <a:off x="597434" y="2319592"/>
+            <a:ext cx="1428362" cy="506511"/>
+          </a:xfrm>
+          <a:prstGeom prst="rect">
+            <a:avLst/>
+          </a:prstGeom>
+          <a:solidFill>
+            <a:schemeClr val="tx1">
+              <a:lumMod val="75000"/>
+              <a:lumOff val="25000"/>
+            </a:schemeClr>
+          </a:solidFill>
+          <a:ln>
+            <a:solidFill>
+              <a:schemeClr val="tx1"/>
+            </a:solidFill>
+          </a:ln>
+        </p:spPr>
+        <p:style>
+          <a:lnRef idx="2">
+            <a:schemeClr val="accent1">
+              <a:shade val="50000"/>
+            </a:schemeClr>
+          </a:lnRef>
+          <a:fillRef idx="1">
+            <a:schemeClr val="accent1"/>
+          </a:fillRef>
+          <a:effectRef idx="0">
+            <a:schemeClr val="accent1"/>
+          </a:effectRef>
+          <a:fontRef idx="minor">
+            <a:schemeClr val="lt1"/>
+          </a:fontRef>
+        </p:style>
+        <p:txBody>
+          <a:bodyPr rtlCol="0" anchor="ctr"/>
+          <a:lstStyle/>
+          <a:p>
+            <a:pPr algn="ctr"/>
+            <a:r>
+              <a:rPr lang="en-US" sz="1400" dirty="0"/>
+              <a:t>2 Contamination Levels</a:t>
+            </a:r>
+          </a:p>
+        </p:txBody>
+      </p:sp>
+      <p:sp>
+        <p:nvSpPr>
+          <p:cNvPr id="139" name="Rectangle 138">
+            <a:extLst>
+              <a:ext uri="{FF2B5EF4-FFF2-40B4-BE49-F238E27FC236}">
+                <a16:creationId xmlns:a16="http://schemas.microsoft.com/office/drawing/2014/main" id="{16EB0796-A815-2D54-693E-414C9AA106EB}"/>
+              </a:ext>
+            </a:extLst>
+          </p:cNvPr>
+          <p:cNvSpPr/>
+          <p:nvPr/>
+        </p:nvSpPr>
+        <p:spPr>
+          <a:xfrm>
+            <a:off x="604328" y="4283171"/>
+            <a:ext cx="1428362" cy="1016364"/>
+          </a:xfrm>
+          <a:prstGeom prst="rect">
+            <a:avLst/>
+          </a:prstGeom>
+          <a:solidFill>
+            <a:schemeClr val="bg1">
+              <a:lumMod val="75000"/>
+            </a:schemeClr>
+          </a:solidFill>
+          <a:ln>
+            <a:solidFill>
+              <a:schemeClr val="tx1">
+                <a:lumMod val="95000"/>
+                <a:lumOff val="5000"/>
+              </a:schemeClr>
+            </a:solidFill>
+          </a:ln>
+        </p:spPr>
+        <p:style>
+          <a:lnRef idx="2">
+            <a:schemeClr val="accent1">
+              <a:shade val="50000"/>
+            </a:schemeClr>
+          </a:lnRef>
+          <a:fillRef idx="1">
+            <a:schemeClr val="accent1"/>
+          </a:fillRef>
+          <a:effectRef idx="0">
+            <a:schemeClr val="accent1"/>
+          </a:effectRef>
+          <a:fontRef idx="minor">
+            <a:schemeClr val="lt1"/>
+          </a:fontRef>
+        </p:style>
+        <p:txBody>
+          <a:bodyPr rtlCol="0" anchor="t"/>
+          <a:lstStyle/>
+          <a:p>
+            <a:pPr marL="171450" indent="-171450">
+              <a:buFont typeface="Arial" panose="020B0604020202020204" pitchFamily="34" charset="0"/>
+              <a:buChar char="•"/>
+            </a:pPr>
+            <a:r>
+              <a:rPr lang="en-US" sz="1100" dirty="0">
+                <a:solidFill>
+                  <a:schemeClr val="tx1"/>
+                </a:solidFill>
+              </a:rPr>
+              <a:t>Daily Contamination</a:t>
+            </a:r>
+          </a:p>
+          <a:p>
+            <a:pPr marL="171450" indent="-171450">
+              <a:buFont typeface="Arial" panose="020B0604020202020204" pitchFamily="34" charset="0"/>
+              <a:buChar char="•"/>
+            </a:pPr>
+            <a:r>
+              <a:rPr lang="en-US" sz="1100" dirty="0">
+                <a:solidFill>
+                  <a:schemeClr val="tx1"/>
+                </a:solidFill>
+              </a:rPr>
+              <a:t>1 random contamination event per season</a:t>
+            </a:r>
+          </a:p>
+          <a:p>
+            <a:pPr marL="171450" indent="-171450">
+              <a:buFont typeface="Arial" panose="020B0604020202020204" pitchFamily="34" charset="0"/>
+              <a:buChar char="•"/>
+            </a:pPr>
+            <a:endParaRPr lang="en-US" sz="1100" dirty="0">
+              <a:solidFill>
+                <a:schemeClr val="tx1"/>
+              </a:solidFill>
+            </a:endParaRPr>
+          </a:p>
+        </p:txBody>
+      </p:sp>
+      <p:sp>
+        <p:nvSpPr>
+          <p:cNvPr id="140" name="Rectangle 139">
+            <a:extLst>
+              <a:ext uri="{FF2B5EF4-FFF2-40B4-BE49-F238E27FC236}">
+                <a16:creationId xmlns:a16="http://schemas.microsoft.com/office/drawing/2014/main" id="{4089E54C-B479-7367-D203-0D04E313BB19}"/>
+              </a:ext>
+            </a:extLst>
+          </p:cNvPr>
+          <p:cNvSpPr/>
+          <p:nvPr/>
+        </p:nvSpPr>
+        <p:spPr>
+          <a:xfrm>
+            <a:off x="605359" y="3776660"/>
+            <a:ext cx="1428362" cy="506511"/>
+          </a:xfrm>
+          <a:prstGeom prst="rect">
+            <a:avLst/>
+          </a:prstGeom>
+          <a:solidFill>
+            <a:schemeClr val="tx1">
+              <a:lumMod val="75000"/>
+              <a:lumOff val="25000"/>
+            </a:schemeClr>
+          </a:solidFill>
+          <a:ln>
+            <a:solidFill>
+              <a:schemeClr val="tx1"/>
+            </a:solidFill>
+          </a:ln>
+        </p:spPr>
+        <p:style>
+          <a:lnRef idx="2">
+            <a:schemeClr val="accent1">
+              <a:shade val="50000"/>
+            </a:schemeClr>
+          </a:lnRef>
+          <a:fillRef idx="1">
+            <a:schemeClr val="accent1"/>
+          </a:fillRef>
+          <a:effectRef idx="0">
+            <a:schemeClr val="accent1"/>
+          </a:effectRef>
+          <a:fontRef idx="minor">
+            <a:schemeClr val="lt1"/>
+          </a:fontRef>
+        </p:style>
+        <p:txBody>
+          <a:bodyPr rtlCol="0" anchor="ctr"/>
+          <a:lstStyle/>
+          <a:p>
+            <a:pPr algn="ctr"/>
+            <a:r>
+              <a:rPr lang="en-US" sz="1400" dirty="0"/>
+              <a:t>2 Contamination Frequencies</a:t>
+            </a:r>
+          </a:p>
+        </p:txBody>
+      </p:sp>
+      <p:cxnSp>
+        <p:nvCxnSpPr>
+          <p:cNvPr id="142" name="Connector: Elbow 141">
+            <a:extLst>
+              <a:ext uri="{FF2B5EF4-FFF2-40B4-BE49-F238E27FC236}">
+                <a16:creationId xmlns:a16="http://schemas.microsoft.com/office/drawing/2014/main" id="{BF4A4EC7-C510-B104-5302-D39C75034E5E}"/>
+              </a:ext>
+            </a:extLst>
+          </p:cNvPr>
+          <p:cNvCxnSpPr>
+            <a:stCxn id="135" idx="3"/>
+            <a:endCxn id="32" idx="1"/>
+          </p:cNvCxnSpPr>
+          <p:nvPr/>
+        </p:nvCxnSpPr>
+        <p:spPr>
+          <a:xfrm>
+            <a:off x="2024765" y="3229972"/>
+            <a:ext cx="697044" cy="379387"/>
+          </a:xfrm>
+          <a:prstGeom prst="bentConnector3">
+            <a:avLst/>
+          </a:prstGeom>
+          <a:ln w="19050">
+            <a:tailEnd type="triangle"/>
+          </a:ln>
+        </p:spPr>
+        <p:style>
+          <a:lnRef idx="1">
+            <a:schemeClr val="dk1"/>
+          </a:lnRef>
+          <a:fillRef idx="0">
+            <a:schemeClr val="dk1"/>
+          </a:fillRef>
+          <a:effectRef idx="0">
+            <a:schemeClr val="dk1"/>
+          </a:effectRef>
+          <a:fontRef idx="minor">
+            <a:schemeClr val="tx1"/>
+          </a:fontRef>
+        </p:style>
+      </p:cxnSp>
+      <p:cxnSp>
+        <p:nvCxnSpPr>
+          <p:cNvPr id="143" name="Connector: Elbow 142">
+            <a:extLst>
+              <a:ext uri="{FF2B5EF4-FFF2-40B4-BE49-F238E27FC236}">
+                <a16:creationId xmlns:a16="http://schemas.microsoft.com/office/drawing/2014/main" id="{1028FEA8-8610-EA04-EF79-9A6B657DD8E2}"/>
+              </a:ext>
+            </a:extLst>
+          </p:cNvPr>
+          <p:cNvCxnSpPr>
+            <a:cxnSpLocks/>
+            <a:stCxn id="139" idx="3"/>
+            <a:endCxn id="32" idx="1"/>
+          </p:cNvCxnSpPr>
+          <p:nvPr/>
+        </p:nvCxnSpPr>
+        <p:spPr>
+          <a:xfrm flipV="1">
+            <a:off x="2032690" y="3609359"/>
+            <a:ext cx="689119" cy="1181994"/>
+          </a:xfrm>
+          <a:prstGeom prst="bentConnector3">
+            <a:avLst>
+              <a:gd name="adj1" fmla="val 50000"/>
+            </a:avLst>
+          </a:prstGeom>
+          <a:ln w="19050">
+            <a:tailEnd type="triangle"/>
+          </a:ln>
+        </p:spPr>
+        <p:style>
+          <a:lnRef idx="1">
+            <a:schemeClr val="dk1"/>
+          </a:lnRef>
+          <a:fillRef idx="0">
+            <a:schemeClr val="dk1"/>
+          </a:fillRef>
+          <a:effectRef idx="0">
+            <a:schemeClr val="dk1"/>
+          </a:effectRef>
+          <a:fontRef idx="minor">
+            <a:schemeClr val="tx1"/>
+          </a:fontRef>
+        </p:style>
+      </p:cxnSp>
+      <p:cxnSp>
+        <p:nvCxnSpPr>
+          <p:cNvPr id="150" name="Straight Arrow Connector 149">
+            <a:extLst>
+              <a:ext uri="{FF2B5EF4-FFF2-40B4-BE49-F238E27FC236}">
+                <a16:creationId xmlns:a16="http://schemas.microsoft.com/office/drawing/2014/main" id="{4DFCB353-84B7-0C71-A8CB-24AA56E80550}"/>
+              </a:ext>
+            </a:extLst>
+          </p:cNvPr>
+          <p:cNvCxnSpPr>
+            <a:cxnSpLocks/>
+            <a:stCxn id="7" idx="2"/>
+            <a:endCxn id="6" idx="0"/>
+          </p:cNvCxnSpPr>
+          <p:nvPr/>
+        </p:nvCxnSpPr>
+        <p:spPr>
+          <a:xfrm flipH="1">
+            <a:off x="3488335" y="2824578"/>
+            <a:ext cx="1" cy="204718"/>
+          </a:xfrm>
+          <a:prstGeom prst="straightConnector1">
+            <a:avLst/>
+          </a:prstGeom>
+          <a:ln w="28575">
+            <a:solidFill>
+              <a:schemeClr val="tx1"/>
+            </a:solidFill>
+            <a:tailEnd type="triangle"/>
+          </a:ln>
+        </p:spPr>
+        <p:style>
+          <a:lnRef idx="1">
+            <a:schemeClr val="accent1"/>
+          </a:lnRef>
+          <a:fillRef idx="0">
+            <a:schemeClr val="accent1"/>
+          </a:fillRef>
+          <a:effectRef idx="0">
+            <a:schemeClr val="accent1"/>
+          </a:effectRef>
+          <a:fontRef idx="minor">
+            <a:schemeClr val="tx1"/>
+          </a:fontRef>
+        </p:style>
+      </p:cxnSp>
+    </p:spTree>
+    <p:extLst>
+      <p:ext uri="{BB962C8B-B14F-4D97-AF65-F5344CB8AC3E}">
+        <p14:creationId xmlns:p14="http://schemas.microsoft.com/office/powerpoint/2010/main" val="3077944333"/>
+      </p:ext>
+    </p:extLst>
+  </p:cSld>
+  <p:clrMapOvr>
+    <a:masterClrMapping/>
+  </p:clrMapOvr>
+</p:sld>
+</file>
+
+<file path=ppt/slides/slide3.xml><?xml version="1.0" encoding="utf-8"?>
+<p:sld xmlns:a="http://schemas.openxmlformats.org/drawingml/2006/main" xmlns:r="http://schemas.openxmlformats.org/officeDocument/2006/relationships" xmlns:p="http://schemas.openxmlformats.org/presentationml/2006/main">
+  <p:cSld>
+    <p:spTree>
+      <p:nvGrpSpPr>
+        <p:cNvPr id="1" name=""/>
+        <p:cNvGrpSpPr/>
+        <p:nvPr/>
+      </p:nvGrpSpPr>
+      <p:grpSpPr>
+        <a:xfrm>
+          <a:off x="0" y="0"/>
+          <a:ext cx="0" cy="0"/>
+          <a:chOff x="0" y="0"/>
+          <a:chExt cx="0" cy="0"/>
+        </a:xfrm>
+      </p:grpSpPr>
+    </p:spTree>
+    <p:extLst>
+      <p:ext uri="{BB962C8B-B14F-4D97-AF65-F5344CB8AC3E}">
+        <p14:creationId xmlns:p14="http://schemas.microsoft.com/office/powerpoint/2010/main" val="2040911649"/>
       </p:ext>
     </p:extLst>
   </p:cSld>

</xml_diff>